<commit_message>
updates to intro ppt
</commit_message>
<xml_diff>
--- a/HSTR121/ppts/History_Rock_Intro.pptx
+++ b/HSTR121/ppts/History_Rock_Intro.pptx
@@ -146,6 +146,10 @@
 </p:presentation>
 </file>
 
+<file path=ppt/revisionInfo.xml><?xml version="1.0" encoding="utf-8"?>
+<p1510:revInfo xmlns:a="http://schemas.openxmlformats.org/drawingml/2006/main" xmlns:r="http://schemas.openxmlformats.org/officeDocument/2006/relationships" xmlns:p1510="http://schemas.microsoft.com/office/powerpoint/2015/10/main"/>
+</file>
+
 <file path=ppt/notesMasters/notesMaster1.xml><?xml version="1.0" encoding="utf-8"?>
 <p:notesMaster xmlns:a="http://schemas.openxmlformats.org/drawingml/2006/main" xmlns:r="http://schemas.openxmlformats.org/officeDocument/2006/relationships" xmlns:p="http://schemas.openxmlformats.org/presentationml/2006/main">
   <p:cSld>
@@ -229,7 +233,7 @@
             <a:fld id="{E28287AA-0D99-42CE-A71B-10FA9908BBF8}" type="datetimeFigureOut">
               <a:rPr lang="en-US" smtClean="0"/>
               <a:pPr/>
-              <a:t>9/27/2015</a:t>
+              <a:t>12/20/2017</a:t>
             </a:fld>
             <a:endParaRPr lang="en-US"/>
           </a:p>
@@ -295,38 +299,37 @@
           <a:p>
             <a:pPr lvl="0"/>
             <a:r>
-              <a:rPr lang="en-US" smtClean="0"/>
+              <a:rPr lang="en-US"/>
               <a:t>Click to edit Master text styles</a:t>
             </a:r>
           </a:p>
           <a:p>
             <a:pPr lvl="1"/>
             <a:r>
-              <a:rPr lang="en-US" smtClean="0"/>
+              <a:rPr lang="en-US"/>
               <a:t>Second level</a:t>
             </a:r>
           </a:p>
           <a:p>
             <a:pPr lvl="2"/>
             <a:r>
-              <a:rPr lang="en-US" smtClean="0"/>
+              <a:rPr lang="en-US"/>
               <a:t>Third level</a:t>
             </a:r>
           </a:p>
           <a:p>
             <a:pPr lvl="3"/>
             <a:r>
-              <a:rPr lang="en-US" smtClean="0"/>
+              <a:rPr lang="en-US"/>
               <a:t>Fourth level</a:t>
             </a:r>
           </a:p>
           <a:p>
             <a:pPr lvl="4"/>
             <a:r>
-              <a:rPr lang="en-US" smtClean="0"/>
+              <a:rPr lang="en-US"/>
               <a:t>Fifth level</a:t>
             </a:r>
-            <a:endParaRPr lang="en-US"/>
           </a:p>
         </p:txBody>
       </p:sp>
@@ -1356,7 +1359,7 @@
           </a:lstStyle>
           <a:p>
             <a:r>
-              <a:rPr lang="en-US" smtClean="0"/>
+              <a:rPr lang="en-US"/>
               <a:t>Click to edit Master subtitle style</a:t>
             </a:r>
             <a:endParaRPr lang="en-US" dirty="0"/>
@@ -1414,7 +1417,7 @@
           </a:lstStyle>
           <a:p>
             <a:r>
-              <a:rPr lang="en-US" smtClean="0"/>
+              <a:rPr lang="en-US"/>
               <a:t>Click to edit Master title style</a:t>
             </a:r>
             <a:endParaRPr lang="en-US" dirty="0"/>
@@ -1574,7 +1577,7 @@
             <a:fld id="{DCFA480D-CB17-4C49-BB2A-C7514E1C7CEA}" type="datetimeFigureOut">
               <a:rPr lang="en-US" smtClean="0"/>
               <a:pPr/>
-              <a:t>9/27/2015</a:t>
+              <a:t>12/20/2017</a:t>
             </a:fld>
             <a:endParaRPr lang="en-US"/>
           </a:p>
@@ -1629,13 +1632,6 @@
   <p:clrMapOvr>
     <a:masterClrMapping/>
   </p:clrMapOvr>
-  <p:timing>
-    <p:tnLst>
-      <p:par>
-        <p:cTn id="1" dur="indefinite" restart="never" nodeType="tmRoot"/>
-      </p:par>
-    </p:tnLst>
-  </p:timing>
 </p:sldLayout>
 </file>
 
@@ -1672,10 +1668,9 @@
           <a:lstStyle/>
           <a:p>
             <a:r>
-              <a:rPr lang="en-US" smtClean="0"/>
+              <a:rPr lang="en-US"/>
               <a:t>Click to edit Master title style</a:t>
             </a:r>
-            <a:endParaRPr lang="en-US"/>
           </a:p>
         </p:txBody>
       </p:sp>
@@ -1696,38 +1691,37 @@
           <a:p>
             <a:pPr lvl="0"/>
             <a:r>
-              <a:rPr lang="en-US" smtClean="0"/>
+              <a:rPr lang="en-US"/>
               <a:t>Click to edit Master text styles</a:t>
             </a:r>
           </a:p>
           <a:p>
             <a:pPr lvl="1"/>
             <a:r>
-              <a:rPr lang="en-US" smtClean="0"/>
+              <a:rPr lang="en-US"/>
               <a:t>Second level</a:t>
             </a:r>
           </a:p>
           <a:p>
             <a:pPr lvl="2"/>
             <a:r>
-              <a:rPr lang="en-US" smtClean="0"/>
+              <a:rPr lang="en-US"/>
               <a:t>Third level</a:t>
             </a:r>
           </a:p>
           <a:p>
             <a:pPr lvl="3"/>
             <a:r>
-              <a:rPr lang="en-US" smtClean="0"/>
+              <a:rPr lang="en-US"/>
               <a:t>Fourth level</a:t>
             </a:r>
           </a:p>
           <a:p>
             <a:pPr lvl="4"/>
             <a:r>
-              <a:rPr lang="en-US" smtClean="0"/>
+              <a:rPr lang="en-US"/>
               <a:t>Fifth level</a:t>
             </a:r>
-            <a:endParaRPr lang="en-US"/>
           </a:p>
         </p:txBody>
       </p:sp>
@@ -1749,7 +1743,7 @@
             <a:fld id="{DCFA480D-CB17-4C49-BB2A-C7514E1C7CEA}" type="datetimeFigureOut">
               <a:rPr lang="en-US" smtClean="0"/>
               <a:pPr/>
-              <a:t>9/27/2015</a:t>
+              <a:t>12/20/2017</a:t>
             </a:fld>
             <a:endParaRPr lang="en-US"/>
           </a:p>
@@ -1803,13 +1797,6 @@
   <p:clrMapOvr>
     <a:masterClrMapping/>
   </p:clrMapOvr>
-  <p:timing>
-    <p:tnLst>
-      <p:par>
-        <p:cTn id="1" dur="indefinite" restart="never" nodeType="tmRoot"/>
-      </p:par>
-    </p:tnLst>
-  </p:timing>
 </p:sldLayout>
 </file>
 
@@ -1851,10 +1838,9 @@
           <a:lstStyle/>
           <a:p>
             <a:r>
-              <a:rPr lang="en-US" smtClean="0"/>
+              <a:rPr lang="en-US"/>
               <a:t>Click to edit Master title style</a:t>
             </a:r>
-            <a:endParaRPr lang="en-US"/>
           </a:p>
         </p:txBody>
       </p:sp>
@@ -1880,38 +1866,37 @@
           <a:p>
             <a:pPr lvl="0"/>
             <a:r>
-              <a:rPr lang="en-US" smtClean="0"/>
+              <a:rPr lang="en-US"/>
               <a:t>Click to edit Master text styles</a:t>
             </a:r>
           </a:p>
           <a:p>
             <a:pPr lvl="1"/>
             <a:r>
-              <a:rPr lang="en-US" smtClean="0"/>
+              <a:rPr lang="en-US"/>
               <a:t>Second level</a:t>
             </a:r>
           </a:p>
           <a:p>
             <a:pPr lvl="2"/>
             <a:r>
-              <a:rPr lang="en-US" smtClean="0"/>
+              <a:rPr lang="en-US"/>
               <a:t>Third level</a:t>
             </a:r>
           </a:p>
           <a:p>
             <a:pPr lvl="3"/>
             <a:r>
-              <a:rPr lang="en-US" smtClean="0"/>
+              <a:rPr lang="en-US"/>
               <a:t>Fourth level</a:t>
             </a:r>
           </a:p>
           <a:p>
             <a:pPr lvl="4"/>
             <a:r>
-              <a:rPr lang="en-US" smtClean="0"/>
+              <a:rPr lang="en-US"/>
               <a:t>Fifth level</a:t>
             </a:r>
-            <a:endParaRPr lang="en-US"/>
           </a:p>
         </p:txBody>
       </p:sp>
@@ -1933,7 +1918,7 @@
             <a:fld id="{DCFA480D-CB17-4C49-BB2A-C7514E1C7CEA}" type="datetimeFigureOut">
               <a:rPr lang="en-US" smtClean="0"/>
               <a:pPr/>
-              <a:t>9/27/2015</a:t>
+              <a:t>12/20/2017</a:t>
             </a:fld>
             <a:endParaRPr lang="en-US"/>
           </a:p>
@@ -1987,13 +1972,6 @@
   <p:clrMapOvr>
     <a:masterClrMapping/>
   </p:clrMapOvr>
-  <p:timing>
-    <p:tnLst>
-      <p:par>
-        <p:cTn id="1" dur="indefinite" restart="never" nodeType="tmRoot"/>
-      </p:par>
-    </p:tnLst>
-  </p:timing>
 </p:sldLayout>
 </file>
 
@@ -2036,35 +2014,35 @@
           <a:p>
             <a:pPr lvl="0"/>
             <a:r>
-              <a:rPr lang="en-US" smtClean="0"/>
+              <a:rPr lang="en-US"/>
               <a:t>Click to edit Master text styles</a:t>
             </a:r>
           </a:p>
           <a:p>
             <a:pPr lvl="1"/>
             <a:r>
-              <a:rPr lang="en-US" smtClean="0"/>
+              <a:rPr lang="en-US"/>
               <a:t>Second level</a:t>
             </a:r>
           </a:p>
           <a:p>
             <a:pPr lvl="2"/>
             <a:r>
-              <a:rPr lang="en-US" smtClean="0"/>
+              <a:rPr lang="en-US"/>
               <a:t>Third level</a:t>
             </a:r>
           </a:p>
           <a:p>
             <a:pPr lvl="3"/>
             <a:r>
-              <a:rPr lang="en-US" smtClean="0"/>
+              <a:rPr lang="en-US"/>
               <a:t>Fourth level</a:t>
             </a:r>
           </a:p>
           <a:p>
             <a:pPr lvl="4"/>
             <a:r>
-              <a:rPr lang="en-US" smtClean="0"/>
+              <a:rPr lang="en-US"/>
               <a:t>Fifth level</a:t>
             </a:r>
             <a:endParaRPr lang="en-US" dirty="0"/>
@@ -2089,7 +2067,7 @@
             <a:fld id="{DCFA480D-CB17-4C49-BB2A-C7514E1C7CEA}" type="datetimeFigureOut">
               <a:rPr lang="en-US" smtClean="0"/>
               <a:pPr/>
-              <a:t>9/27/2015</a:t>
+              <a:t>12/20/2017</a:t>
             </a:fld>
             <a:endParaRPr lang="en-US"/>
           </a:p>
@@ -2159,10 +2137,9 @@
           <a:lstStyle/>
           <a:p>
             <a:r>
-              <a:rPr lang="en-US" smtClean="0"/>
+              <a:rPr lang="en-US"/>
               <a:t>Click to edit Master title style</a:t>
             </a:r>
-            <a:endParaRPr lang="en-US"/>
           </a:p>
         </p:txBody>
       </p:sp>
@@ -2171,13 +2148,6 @@
   <p:clrMapOvr>
     <a:masterClrMapping/>
   </p:clrMapOvr>
-  <p:timing>
-    <p:tnLst>
-      <p:par>
-        <p:cTn id="1" dur="indefinite" restart="never" nodeType="tmRoot"/>
-      </p:par>
-    </p:tnLst>
-  </p:timing>
 </p:sldLayout>
 </file>
 
@@ -2221,7 +2191,7 @@
             <a:fld id="{DCFA480D-CB17-4C49-BB2A-C7514E1C7CEA}" type="datetimeFigureOut">
               <a:rPr lang="en-US" smtClean="0"/>
               <a:pPr/>
-              <a:t>9/27/2015</a:t>
+              <a:t>12/20/2017</a:t>
             </a:fld>
             <a:endParaRPr lang="en-US" dirty="0"/>
           </a:p>
@@ -2322,7 +2292,7 @@
           </a:lstStyle>
           <a:p>
             <a:r>
-              <a:rPr lang="en-US" smtClean="0"/>
+              <a:rPr lang="en-US"/>
               <a:t>Click to edit Master title style</a:t>
             </a:r>
             <a:endParaRPr lang="en-US" dirty="0"/>
@@ -2400,7 +2370,7 @@
           <a:p>
             <a:pPr lvl="0"/>
             <a:r>
-              <a:rPr lang="en-US" smtClean="0"/>
+              <a:rPr lang="en-US"/>
               <a:t>Click to edit Master text styles</a:t>
             </a:r>
           </a:p>
@@ -2455,13 +2425,6 @@
   <p:clrMapOvr>
     <a:overrideClrMapping bg1="lt1" tx1="dk1" bg2="lt2" tx2="dk2" accent1="accent1" accent2="accent2" accent3="accent3" accent4="accent4" accent5="accent5" accent6="accent6" hlink="hlink" folHlink="folHlink"/>
   </p:clrMapOvr>
-  <p:timing>
-    <p:tnLst>
-      <p:par>
-        <p:cTn id="1" dur="indefinite" restart="never" nodeType="tmRoot"/>
-      </p:par>
-    </p:tnLst>
-  </p:timing>
 </p:sldLayout>
 </file>
 
@@ -2500,7 +2463,7 @@
             <a:fld id="{DCFA480D-CB17-4C49-BB2A-C7514E1C7CEA}" type="datetimeFigureOut">
               <a:rPr lang="en-US" smtClean="0"/>
               <a:pPr/>
-              <a:t>9/27/2015</a:t>
+              <a:t>12/20/2017</a:t>
             </a:fld>
             <a:endParaRPr lang="en-US" dirty="0"/>
           </a:p>
@@ -2565,7 +2528,7 @@
           <a:lstStyle/>
           <a:p>
             <a:r>
-              <a:rPr lang="en-US" smtClean="0"/>
+              <a:rPr lang="en-US"/>
               <a:t>Click to edit Master title style</a:t>
             </a:r>
             <a:endParaRPr lang="en-US" dirty="0"/>
@@ -2594,35 +2557,35 @@
           <a:p>
             <a:pPr lvl="0"/>
             <a:r>
-              <a:rPr lang="en-US" smtClean="0"/>
+              <a:rPr lang="en-US"/>
               <a:t>Click to edit Master text styles</a:t>
             </a:r>
           </a:p>
           <a:p>
             <a:pPr lvl="1"/>
             <a:r>
-              <a:rPr lang="en-US" smtClean="0"/>
+              <a:rPr lang="en-US"/>
               <a:t>Second level</a:t>
             </a:r>
           </a:p>
           <a:p>
             <a:pPr lvl="2"/>
             <a:r>
-              <a:rPr lang="en-US" smtClean="0"/>
+              <a:rPr lang="en-US"/>
               <a:t>Third level</a:t>
             </a:r>
           </a:p>
           <a:p>
             <a:pPr lvl="3"/>
             <a:r>
-              <a:rPr lang="en-US" smtClean="0"/>
+              <a:rPr lang="en-US"/>
               <a:t>Fourth level</a:t>
             </a:r>
           </a:p>
           <a:p>
             <a:pPr lvl="4"/>
             <a:r>
-              <a:rPr lang="en-US" smtClean="0"/>
+              <a:rPr lang="en-US"/>
               <a:t>Fifth level</a:t>
             </a:r>
             <a:endParaRPr lang="en-US" dirty="0"/>
@@ -2651,35 +2614,35 @@
           <a:p>
             <a:pPr lvl="0"/>
             <a:r>
-              <a:rPr lang="en-US" smtClean="0"/>
+              <a:rPr lang="en-US"/>
               <a:t>Click to edit Master text styles</a:t>
             </a:r>
           </a:p>
           <a:p>
             <a:pPr lvl="1"/>
             <a:r>
-              <a:rPr lang="en-US" smtClean="0"/>
+              <a:rPr lang="en-US"/>
               <a:t>Second level</a:t>
             </a:r>
           </a:p>
           <a:p>
             <a:pPr lvl="2"/>
             <a:r>
-              <a:rPr lang="en-US" smtClean="0"/>
+              <a:rPr lang="en-US"/>
               <a:t>Third level</a:t>
             </a:r>
           </a:p>
           <a:p>
             <a:pPr lvl="3"/>
             <a:r>
-              <a:rPr lang="en-US" smtClean="0"/>
+              <a:rPr lang="en-US"/>
               <a:t>Fourth level</a:t>
             </a:r>
           </a:p>
           <a:p>
             <a:pPr lvl="4"/>
             <a:r>
-              <a:rPr lang="en-US" smtClean="0"/>
+              <a:rPr lang="en-US"/>
               <a:t>Fifth level</a:t>
             </a:r>
             <a:endParaRPr lang="en-US" dirty="0"/>
@@ -2691,13 +2654,6 @@
   <p:clrMapOvr>
     <a:masterClrMapping/>
   </p:clrMapOvr>
-  <p:timing>
-    <p:tnLst>
-      <p:par>
-        <p:cTn id="1" dur="indefinite" restart="never" nodeType="tmRoot"/>
-      </p:par>
-    </p:tnLst>
-  </p:timing>
 </p:sldLayout>
 </file>
 
@@ -2779,7 +2735,7 @@
             <a:fld id="{DCFA480D-CB17-4C49-BB2A-C7514E1C7CEA}" type="datetimeFigureOut">
               <a:rPr lang="en-US" smtClean="0"/>
               <a:pPr/>
-              <a:t>9/27/2015</a:t>
+              <a:t>12/20/2017</a:t>
             </a:fld>
             <a:endParaRPr lang="en-US" dirty="0"/>
           </a:p>
@@ -2860,7 +2816,7 @@
           <a:p>
             <a:pPr lvl="0"/>
             <a:r>
-              <a:rPr lang="en-US" smtClean="0"/>
+              <a:rPr lang="en-US"/>
               <a:t>Click to edit Master text styles</a:t>
             </a:r>
           </a:p>
@@ -2888,35 +2844,35 @@
           <a:p>
             <a:pPr lvl="0"/>
             <a:r>
-              <a:rPr lang="en-US" smtClean="0"/>
+              <a:rPr lang="en-US"/>
               <a:t>Click to edit Master text styles</a:t>
             </a:r>
           </a:p>
           <a:p>
             <a:pPr lvl="1"/>
             <a:r>
-              <a:rPr lang="en-US" smtClean="0"/>
+              <a:rPr lang="en-US"/>
               <a:t>Second level</a:t>
             </a:r>
           </a:p>
           <a:p>
             <a:pPr lvl="2"/>
             <a:r>
-              <a:rPr lang="en-US" smtClean="0"/>
+              <a:rPr lang="en-US"/>
               <a:t>Third level</a:t>
             </a:r>
           </a:p>
           <a:p>
             <a:pPr lvl="3"/>
             <a:r>
-              <a:rPr lang="en-US" smtClean="0"/>
+              <a:rPr lang="en-US"/>
               <a:t>Fourth level</a:t>
             </a:r>
           </a:p>
           <a:p>
             <a:pPr lvl="4"/>
             <a:r>
-              <a:rPr lang="en-US" smtClean="0"/>
+              <a:rPr lang="en-US"/>
               <a:t>Fifth level</a:t>
             </a:r>
             <a:endParaRPr lang="en-US" dirty="0"/>
@@ -2945,35 +2901,35 @@
           <a:p>
             <a:pPr lvl="0"/>
             <a:r>
-              <a:rPr lang="en-US" smtClean="0"/>
+              <a:rPr lang="en-US"/>
               <a:t>Click to edit Master text styles</a:t>
             </a:r>
           </a:p>
           <a:p>
             <a:pPr lvl="1"/>
             <a:r>
-              <a:rPr lang="en-US" smtClean="0"/>
+              <a:rPr lang="en-US"/>
               <a:t>Second level</a:t>
             </a:r>
           </a:p>
           <a:p>
             <a:pPr lvl="2"/>
             <a:r>
-              <a:rPr lang="en-US" smtClean="0"/>
+              <a:rPr lang="en-US"/>
               <a:t>Third level</a:t>
             </a:r>
           </a:p>
           <a:p>
             <a:pPr lvl="3"/>
             <a:r>
-              <a:rPr lang="en-US" smtClean="0"/>
+              <a:rPr lang="en-US"/>
               <a:t>Fourth level</a:t>
             </a:r>
           </a:p>
           <a:p>
             <a:pPr lvl="4"/>
             <a:r>
-              <a:rPr lang="en-US" smtClean="0"/>
+              <a:rPr lang="en-US"/>
               <a:t>Fifth level</a:t>
             </a:r>
             <a:endParaRPr lang="en-US" dirty="0"/>
@@ -3005,7 +2961,7 @@
           </a:lstStyle>
           <a:p>
             <a:r>
-              <a:rPr lang="en-US" smtClean="0"/>
+              <a:rPr lang="en-US"/>
               <a:t>Click to edit Master title style</a:t>
             </a:r>
             <a:endParaRPr lang="en-US" dirty="0"/>
@@ -3086,7 +3042,7 @@
           <a:p>
             <a:pPr lvl="0"/>
             <a:r>
-              <a:rPr lang="en-US" smtClean="0"/>
+              <a:rPr lang="en-US"/>
               <a:t>Click to edit Master text styles</a:t>
             </a:r>
           </a:p>
@@ -3189,13 +3145,6 @@
   <p:clrMapOvr>
     <a:masterClrMapping/>
   </p:clrMapOvr>
-  <p:timing>
-    <p:tnLst>
-      <p:par>
-        <p:cTn id="1" dur="indefinite" restart="never" nodeType="tmRoot"/>
-      </p:par>
-    </p:tnLst>
-  </p:timing>
 </p:sldLayout>
 </file>
 
@@ -3234,7 +3183,7 @@
             <a:fld id="{DCFA480D-CB17-4C49-BB2A-C7514E1C7CEA}" type="datetimeFigureOut">
               <a:rPr lang="en-US" smtClean="0"/>
               <a:pPr/>
-              <a:t>9/27/2015</a:t>
+              <a:t>12/20/2017</a:t>
             </a:fld>
             <a:endParaRPr lang="en-US" dirty="0"/>
           </a:p>
@@ -3299,7 +3248,7 @@
           <a:lstStyle/>
           <a:p>
             <a:r>
-              <a:rPr lang="en-US" smtClean="0"/>
+              <a:rPr lang="en-US"/>
               <a:t>Click to edit Master title style</a:t>
             </a:r>
             <a:endParaRPr lang="en-US" dirty="0"/>
@@ -3311,13 +3260,6 @@
   <p:clrMapOvr>
     <a:masterClrMapping/>
   </p:clrMapOvr>
-  <p:timing>
-    <p:tnLst>
-      <p:par>
-        <p:cTn id="1" dur="indefinite" restart="never" nodeType="tmRoot"/>
-      </p:par>
-    </p:tnLst>
-  </p:timing>
 </p:sldLayout>
 </file>
 
@@ -3356,7 +3298,7 @@
             <a:fld id="{DCFA480D-CB17-4C49-BB2A-C7514E1C7CEA}" type="datetimeFigureOut">
               <a:rPr lang="en-US" smtClean="0"/>
               <a:pPr/>
-              <a:t>9/27/2015</a:t>
+              <a:t>12/20/2017</a:t>
             </a:fld>
             <a:endParaRPr lang="en-US" dirty="0"/>
           </a:p>
@@ -3452,35 +3394,35 @@
           <a:p>
             <a:pPr lvl="0"/>
             <a:r>
-              <a:rPr lang="en-US" smtClean="0"/>
+              <a:rPr lang="en-US"/>
               <a:t>Click to edit Master text styles</a:t>
             </a:r>
           </a:p>
           <a:p>
             <a:pPr lvl="1"/>
             <a:r>
-              <a:rPr lang="en-US" smtClean="0"/>
+              <a:rPr lang="en-US"/>
               <a:t>Second level</a:t>
             </a:r>
           </a:p>
           <a:p>
             <a:pPr lvl="2"/>
             <a:r>
-              <a:rPr lang="en-US" smtClean="0"/>
+              <a:rPr lang="en-US"/>
               <a:t>Third level</a:t>
             </a:r>
           </a:p>
           <a:p>
             <a:pPr lvl="3"/>
             <a:r>
-              <a:rPr lang="en-US" smtClean="0"/>
+              <a:rPr lang="en-US"/>
               <a:t>Fourth level</a:t>
             </a:r>
           </a:p>
           <a:p>
             <a:pPr lvl="4"/>
             <a:r>
-              <a:rPr lang="en-US" smtClean="0"/>
+              <a:rPr lang="en-US"/>
               <a:t>Fifth level</a:t>
             </a:r>
             <a:endParaRPr lang="en-US" dirty="0"/>
@@ -3540,7 +3482,7 @@
           <a:p>
             <a:pPr lvl="0"/>
             <a:r>
-              <a:rPr lang="en-US" smtClean="0"/>
+              <a:rPr lang="en-US"/>
               <a:t>Click to edit Master text styles</a:t>
             </a:r>
           </a:p>
@@ -3583,7 +3525,7 @@
           </a:lstStyle>
           <a:p>
             <a:r>
-              <a:rPr lang="en-US" smtClean="0"/>
+              <a:rPr lang="en-US"/>
               <a:t>Click to edit Master title style</a:t>
             </a:r>
             <a:endParaRPr lang="en-US" dirty="0"/>
@@ -3608,7 +3550,7 @@
             <a:fld id="{DCFA480D-CB17-4C49-BB2A-C7514E1C7CEA}" type="datetimeFigureOut">
               <a:rPr lang="en-US" smtClean="0"/>
               <a:pPr/>
-              <a:t>9/27/2015</a:t>
+              <a:t>12/20/2017</a:t>
             </a:fld>
             <a:endParaRPr lang="en-US"/>
           </a:p>
@@ -3720,7 +3662,7 @@
           </a:lstStyle>
           <a:p>
             <a:r>
-              <a:rPr lang="en-US" smtClean="0"/>
+              <a:rPr lang="en-US"/>
               <a:t>Click to edit Master title style</a:t>
             </a:r>
             <a:endParaRPr lang="en-US" dirty="0"/>
@@ -3770,7 +3712,7 @@
           </a:lstStyle>
           <a:p>
             <a:r>
-              <a:rPr lang="en-US" smtClean="0"/>
+              <a:rPr lang="en-US"/>
               <a:t>Click icon to add picture</a:t>
             </a:r>
             <a:endParaRPr lang="en-US" dirty="0"/>
@@ -3827,7 +3769,7 @@
           <a:p>
             <a:pPr lvl="0"/>
             <a:r>
-              <a:rPr lang="en-US" smtClean="0"/>
+              <a:rPr lang="en-US"/>
               <a:t>Click to edit Master text styles</a:t>
             </a:r>
           </a:p>
@@ -3851,7 +3793,7 @@
             <a:fld id="{DCFA480D-CB17-4C49-BB2A-C7514E1C7CEA}" type="datetimeFigureOut">
               <a:rPr lang="en-US" smtClean="0"/>
               <a:pPr/>
-              <a:t>9/27/2015</a:t>
+              <a:t>12/20/2017</a:t>
             </a:fld>
             <a:endParaRPr lang="en-US"/>
           </a:p>
@@ -3906,13 +3848,6 @@
   <p:clrMapOvr>
     <a:masterClrMapping/>
   </p:clrMapOvr>
-  <p:timing>
-    <p:tnLst>
-      <p:par>
-        <p:cTn id="1" dur="indefinite" restart="never" nodeType="tmRoot"/>
-      </p:par>
-    </p:tnLst>
-  </p:timing>
 </p:sldLayout>
 </file>
 
@@ -3965,35 +3900,35 @@
           <a:p>
             <a:pPr lvl="0"/>
             <a:r>
-              <a:rPr lang="en-US" smtClean="0"/>
+              <a:rPr lang="en-US"/>
               <a:t>Click to edit Master text styles</a:t>
             </a:r>
           </a:p>
           <a:p>
             <a:pPr lvl="1"/>
             <a:r>
-              <a:rPr lang="en-US" smtClean="0"/>
+              <a:rPr lang="en-US"/>
               <a:t>Second level</a:t>
             </a:r>
           </a:p>
           <a:p>
             <a:pPr lvl="2"/>
             <a:r>
-              <a:rPr lang="en-US" smtClean="0"/>
+              <a:rPr lang="en-US"/>
               <a:t>Third level</a:t>
             </a:r>
           </a:p>
           <a:p>
             <a:pPr lvl="3"/>
             <a:r>
-              <a:rPr lang="en-US" smtClean="0"/>
+              <a:rPr lang="en-US"/>
               <a:t>Fourth level</a:t>
             </a:r>
           </a:p>
           <a:p>
             <a:pPr lvl="4"/>
             <a:r>
-              <a:rPr lang="en-US" smtClean="0"/>
+              <a:rPr lang="en-US"/>
               <a:t>Fifth level</a:t>
             </a:r>
             <a:endParaRPr lang="en-US" dirty="0"/>
@@ -4034,7 +3969,7 @@
             <a:fld id="{DCFA480D-CB17-4C49-BB2A-C7514E1C7CEA}" type="datetimeFigureOut">
               <a:rPr lang="en-US" smtClean="0"/>
               <a:pPr/>
-              <a:t>9/27/2015</a:t>
+              <a:t>12/20/2017</a:t>
             </a:fld>
             <a:endParaRPr lang="en-US" sz="1200" dirty="0">
               <a:solidFill>
@@ -4161,7 +4096,7 @@
           <a:lstStyle/>
           <a:p>
             <a:r>
-              <a:rPr lang="en-US" smtClean="0"/>
+              <a:rPr lang="en-US"/>
               <a:t>Click to edit Master title style</a:t>
             </a:r>
             <a:endParaRPr lang="en-US" dirty="0"/>
@@ -4184,13 +4119,6 @@
     <p:sldLayoutId id="2147483670" r:id="rId10"/>
     <p:sldLayoutId id="2147483671" r:id="rId11"/>
   </p:sldLayoutIdLst>
-  <p:timing>
-    <p:tnLst>
-      <p:par>
-        <p:cTn id="1" dur="indefinite" restart="never" nodeType="tmRoot"/>
-      </p:par>
-    </p:tnLst>
-  </p:timing>
   <p:txStyles>
     <p:titleStyle>
       <a:lvl1pPr algn="l" rtl="0" eaLnBrk="1" latinLnBrk="0" hangingPunct="1">
@@ -4558,7 +4486,7 @@
           <a:lstStyle/>
           <a:p>
             <a:r>
-              <a:rPr lang="en-US" dirty="0" smtClean="0">
+              <a:rPr lang="en-US" dirty="0">
                 <a:solidFill>
                   <a:schemeClr val="tx2">
                     <a:lumMod val="25000"/>
@@ -4567,13 +4495,6 @@
               </a:rPr>
               <a:t>Mark R. Baker</a:t>
             </a:r>
-            <a:endParaRPr lang="en-US" dirty="0">
-              <a:solidFill>
-                <a:schemeClr val="tx2">
-                  <a:lumMod val="25000"/>
-                </a:schemeClr>
-              </a:solidFill>
-            </a:endParaRPr>
           </a:p>
         </p:txBody>
       </p:sp>
@@ -4598,29 +4519,40 @@
           <a:lstStyle/>
           <a:p>
             <a:r>
-              <a:rPr lang="en-US" sz="6600" dirty="0" smtClean="0">
+              <a:rPr lang="en-US" sz="6600" b="1" dirty="0">
                 <a:solidFill>
                   <a:schemeClr val="bg1"/>
                 </a:solidFill>
               </a:rPr>
-              <a:t>History 350: </a:t>
-            </a:r>
-            <a:br>
-              <a:rPr lang="en-US" sz="6600" dirty="0" smtClean="0">
+              <a:t>HSTR 121: </a:t>
+            </a:r>
+            <a:r>
+              <a:rPr lang="en-US" b="1" dirty="0">
                 <a:solidFill>
                   <a:schemeClr val="bg1"/>
                 </a:solidFill>
+                <a:effectLst/>
               </a:rPr>
-            </a:br>
-            <a:r>
-              <a:rPr lang="en-US" sz="6600" dirty="0" smtClean="0">
+              <a:t>History, Music and the American Century </a:t>
+            </a:r>
+            <a:br>
+              <a:rPr lang="en-US" b="1" dirty="0">
                 <a:solidFill>
                   <a:schemeClr val="bg1"/>
                 </a:solidFill>
+                <a:effectLst/>
               </a:rPr>
-              <a:t>A History of Rock and Roll, Introduction</a:t>
-            </a:r>
-            <a:endParaRPr lang="en-US" sz="6600" dirty="0">
+            </a:br>
+            <a:r>
+              <a:rPr lang="en-US" b="1" dirty="0">
+                <a:solidFill>
+                  <a:schemeClr val="bg1"/>
+                </a:solidFill>
+                <a:effectLst/>
+              </a:rPr>
+              <a:t>(counter-culture and capitalism)</a:t>
+            </a:r>
+            <a:endParaRPr lang="en-US" sz="6600" b="1" dirty="0">
               <a:solidFill>
                 <a:schemeClr val="bg1"/>
               </a:solidFill>
@@ -4633,13 +4565,6 @@
   <p:clrMapOvr>
     <a:masterClrMapping/>
   </p:clrMapOvr>
-  <p:timing>
-    <p:tnLst>
-      <p:par>
-        <p:cTn id="1" dur="indefinite" restart="never" nodeType="tmRoot"/>
-      </p:par>
-    </p:tnLst>
-  </p:timing>
 </p:sld>
 </file>
 
@@ -4705,18 +4630,17 @@
           <a:lstStyle/>
           <a:p>
             <a:r>
-              <a:rPr lang="en-US" sz="3200" dirty="0" smtClean="0"/>
+              <a:rPr lang="en-US" sz="3200" dirty="0"/>
               <a:t>‘Roll, Jordan, Roll!” as performed in </a:t>
             </a:r>
             <a:r>
-              <a:rPr lang="en-US" sz="3200" i="1" dirty="0" smtClean="0"/>
+              <a:rPr lang="en-US" sz="3200" i="1" dirty="0"/>
               <a:t>Twelve Years a Slave </a:t>
             </a:r>
             <a:r>
-              <a:rPr lang="en-US" sz="3200" dirty="0" smtClean="0"/>
+              <a:rPr lang="en-US" sz="3200" dirty="0"/>
               <a:t>(written by C. Wesley, mid-1700s)</a:t>
             </a:r>
-            <a:endParaRPr lang="en-US" sz="3200" dirty="0"/>
           </a:p>
         </p:txBody>
       </p:sp>
@@ -4730,13 +4654,6 @@
   <p:clrMapOvr>
     <a:masterClrMapping/>
   </p:clrMapOvr>
-  <p:timing>
-    <p:tnLst>
-      <p:par>
-        <p:cTn id="1" dur="indefinite" restart="never" nodeType="tmRoot"/>
-      </p:par>
-    </p:tnLst>
-  </p:timing>
 </p:sld>
 </file>
 
@@ -4801,7 +4718,7 @@
           <a:lstStyle/>
           <a:p>
             <a:r>
-              <a:rPr lang="en-US" sz="2400" b="1" dirty="0" smtClean="0">
+              <a:rPr lang="en-US" sz="2400" b="1" dirty="0">
                 <a:effectLst/>
                 <a:latin typeface="+mn-lt"/>
               </a:rPr>
@@ -4812,17 +4729,10 @@
                 <a:effectLst/>
                 <a:latin typeface="+mn-lt"/>
               </a:rPr>
-              <a:t>Journal of a residence on a Georgian plantation in </a:t>
-            </a:r>
-            <a:r>
-              <a:rPr lang="en-US" sz="2400" b="1" i="1" dirty="0" smtClean="0">
-                <a:effectLst/>
-                <a:latin typeface="+mn-lt"/>
-              </a:rPr>
-              <a:t>1838-1839 </a:t>
-            </a:r>
-            <a:r>
-              <a:rPr lang="en-US" sz="2400" b="1" dirty="0" smtClean="0">
+              <a:t>Journal of a residence on a Georgian plantation in 1838-1839 </a:t>
+            </a:r>
+            <a:r>
+              <a:rPr lang="en-US" sz="2400" b="1" dirty="0">
                 <a:effectLst/>
                 <a:latin typeface="+mn-lt"/>
               </a:rPr>
@@ -4857,10 +4767,9 @@
           <a:lstStyle/>
           <a:p>
             <a:r>
-              <a:rPr lang="en-US" sz="2800" dirty="0" smtClean="0"/>
+              <a:rPr lang="en-US" sz="2800" dirty="0"/>
               <a:t>Is this the essence of the commercialization of African-American Music?</a:t>
             </a:r>
-            <a:endParaRPr lang="en-US" sz="2800" dirty="0"/>
           </a:p>
         </p:txBody>
       </p:sp>
@@ -4874,13 +4783,6 @@
   <p:clrMapOvr>
     <a:masterClrMapping/>
   </p:clrMapOvr>
-  <p:timing>
-    <p:tnLst>
-      <p:par>
-        <p:cTn id="1" dur="indefinite" restart="never" nodeType="tmRoot"/>
-      </p:par>
-    </p:tnLst>
-  </p:timing>
 </p:sld>
 </file>
 
@@ -4975,13 +4877,6 @@
   <p:clrMapOvr>
     <a:masterClrMapping/>
   </p:clrMapOvr>
-  <p:timing>
-    <p:tnLst>
-      <p:par>
-        <p:cTn id="1" dur="indefinite" restart="never" nodeType="tmRoot"/>
-      </p:par>
-    </p:tnLst>
-  </p:timing>
 </p:sld>
 </file>
 
@@ -5018,31 +4913,31 @@
           <a:lstStyle/>
           <a:p>
             <a:r>
-              <a:rPr lang="en-US" dirty="0" smtClean="0"/>
+              <a:rPr lang="en-US" dirty="0"/>
               <a:t>Fought mainly over slavery</a:t>
             </a:r>
           </a:p>
           <a:p>
             <a:r>
-              <a:rPr lang="en-US" dirty="0" smtClean="0"/>
+              <a:rPr lang="en-US" dirty="0"/>
               <a:t>Southern states saw as a states’ rights issue versus federal government.</a:t>
             </a:r>
           </a:p>
           <a:p>
             <a:r>
-              <a:rPr lang="en-US" dirty="0" smtClean="0"/>
+              <a:rPr lang="en-US" dirty="0"/>
               <a:t>Confederate States of America left the union, following Abraham Lincoln’s November 1860 election as US President.</a:t>
             </a:r>
           </a:p>
           <a:p>
             <a:r>
-              <a:rPr lang="en-US" dirty="0" smtClean="0"/>
+              <a:rPr lang="en-US" dirty="0"/>
               <a:t>625,000-850,000 died in the war.</a:t>
             </a:r>
           </a:p>
           <a:p>
             <a:r>
-              <a:rPr lang="en-US" dirty="0" smtClean="0"/>
+              <a:rPr lang="en-US" dirty="0"/>
               <a:t>Despite efforts during reconstruction, African-Americans remained second-class citizens.</a:t>
             </a:r>
           </a:p>
@@ -5067,10 +4962,9 @@
           <a:lstStyle/>
           <a:p>
             <a:r>
-              <a:rPr lang="en-US" dirty="0" smtClean="0"/>
+              <a:rPr lang="en-US" dirty="0"/>
               <a:t>US Civil War, 1861-1865</a:t>
             </a:r>
-            <a:endParaRPr lang="en-US" dirty="0"/>
           </a:p>
         </p:txBody>
       </p:sp>
@@ -5079,13 +4973,6 @@
   <p:clrMapOvr>
     <a:masterClrMapping/>
   </p:clrMapOvr>
-  <p:timing>
-    <p:tnLst>
-      <p:par>
-        <p:cTn id="1" dur="indefinite" restart="never" nodeType="tmRoot"/>
-      </p:par>
-    </p:tnLst>
-  </p:timing>
 </p:sld>
 </file>
 
@@ -5124,14 +5011,13 @@
           <a:lstStyle/>
           <a:p>
             <a:r>
-              <a:rPr lang="en-US" i="1" dirty="0" smtClean="0"/>
+              <a:rPr lang="en-US" i="1" dirty="0"/>
               <a:t>Slave Songs of the United States </a:t>
             </a:r>
             <a:r>
-              <a:rPr lang="en-US" dirty="0" smtClean="0"/>
+              <a:rPr lang="en-US" dirty="0"/>
               <a:t>(1867)</a:t>
             </a:r>
-            <a:endParaRPr lang="en-US" dirty="0"/>
           </a:p>
         </p:txBody>
       </p:sp>
@@ -5158,18 +5044,17 @@
           <a:lstStyle/>
           <a:p>
             <a:r>
-              <a:rPr lang="en-US" dirty="0" smtClean="0"/>
+              <a:rPr lang="en-US" dirty="0"/>
               <a:t>W. F. Allen, C. P. Ware, and L. M. Garrison, </a:t>
             </a:r>
             <a:r>
-              <a:rPr lang="en-US" i="1" dirty="0" smtClean="0"/>
+              <a:rPr lang="en-US" i="1" dirty="0"/>
               <a:t>Slave Songs of the United States</a:t>
             </a:r>
             <a:r>
-              <a:rPr lang="en-US" dirty="0" smtClean="0"/>
+              <a:rPr lang="en-US" dirty="0"/>
               <a:t> (New York: Peter Smith, 1867), p. VI.</a:t>
             </a:r>
-            <a:endParaRPr lang="en-US" dirty="0"/>
           </a:p>
         </p:txBody>
       </p:sp>
@@ -5209,13 +5094,6 @@
   <p:clrMapOvr>
     <a:masterClrMapping/>
   </p:clrMapOvr>
-  <p:timing>
-    <p:tnLst>
-      <p:par>
-        <p:cTn id="1" dur="indefinite" restart="never" nodeType="tmRoot"/>
-      </p:par>
-    </p:tnLst>
-  </p:timing>
 </p:sld>
 </file>
 
@@ -5257,24 +5135,24 @@
           <a:lstStyle/>
           <a:p>
             <a:r>
-              <a:rPr lang="en-US" dirty="0" smtClean="0"/>
+              <a:rPr lang="en-US" dirty="0"/>
               <a:t>State and local laws focused on segregation</a:t>
             </a:r>
           </a:p>
           <a:p>
             <a:r>
-              <a:rPr lang="en-US" dirty="0" smtClean="0"/>
+              <a:rPr lang="en-US" dirty="0"/>
               <a:t>De jure racial segregation in southern states: “separate but equal”</a:t>
             </a:r>
           </a:p>
           <a:p>
             <a:r>
-              <a:rPr lang="en-US" dirty="0" smtClean="0"/>
+              <a:rPr lang="en-US" dirty="0"/>
               <a:t>Public schools, public spaces, transportation, restaurants, restrooms, drinking fountains, etc.</a:t>
             </a:r>
           </a:p>
           <a:p>
-            <a:endParaRPr lang="en-US" dirty="0" smtClean="0"/>
+            <a:endParaRPr lang="en-US" dirty="0"/>
           </a:p>
           <a:p>
             <a:endParaRPr lang="en-US" dirty="0"/>
@@ -5299,10 +5177,9 @@
           <a:lstStyle/>
           <a:p>
             <a:r>
-              <a:rPr lang="en-US" dirty="0" smtClean="0"/>
+              <a:rPr lang="en-US" dirty="0"/>
               <a:t>Jim Crow Laws, 1870s-1960s	</a:t>
             </a:r>
-            <a:endParaRPr lang="en-US" dirty="0"/>
           </a:p>
         </p:txBody>
       </p:sp>
@@ -5347,13 +5224,6 @@
   <p:clrMapOvr>
     <a:masterClrMapping/>
   </p:clrMapOvr>
-  <p:timing>
-    <p:tnLst>
-      <p:par>
-        <p:cTn id="1" dur="indefinite" restart="never" nodeType="tmRoot"/>
-      </p:par>
-    </p:tnLst>
-  </p:timing>
 </p:sld>
 </file>
 
@@ -5439,13 +5309,6 @@
   <p:clrMapOvr>
     <a:masterClrMapping/>
   </p:clrMapOvr>
-  <p:timing>
-    <p:tnLst>
-      <p:par>
-        <p:cTn id="1" dur="indefinite" restart="never" nodeType="tmRoot"/>
-      </p:par>
-    </p:tnLst>
-  </p:timing>
 </p:sld>
 </file>
 
@@ -5553,7 +5416,7 @@
               <a:buChar char="•"/>
             </a:pPr>
             <a:r>
-              <a:rPr lang="en-US" sz="3200" dirty="0" smtClean="0"/>
+              <a:rPr lang="en-US" sz="3200" dirty="0"/>
               <a:t>Ku Klux Klan</a:t>
             </a:r>
           </a:p>
@@ -5563,10 +5426,10 @@
               <a:buChar char="•"/>
             </a:pPr>
             <a:r>
-              <a:rPr lang="en-US" sz="3200" dirty="0" err="1" smtClean="0"/>
+              <a:rPr lang="en-US" sz="3200" dirty="0" err="1"/>
               <a:t>Lynchings</a:t>
             </a:r>
-            <a:endParaRPr lang="en-US" sz="3200" dirty="0" smtClean="0"/>
+            <a:endParaRPr lang="en-US" sz="3200" dirty="0"/>
           </a:p>
           <a:p>
             <a:pPr marL="285750" indent="-285750">
@@ -5574,7 +5437,7 @@
               <a:buChar char="•"/>
             </a:pPr>
             <a:r>
-              <a:rPr lang="en-US" sz="3200" dirty="0" smtClean="0"/>
+              <a:rPr lang="en-US" sz="3200" dirty="0"/>
               <a:t>Began before civil war</a:t>
             </a:r>
           </a:p>
@@ -5584,11 +5447,11 @@
               <a:buChar char="•"/>
             </a:pPr>
             <a:r>
-              <a:rPr lang="en-US" sz="3200" dirty="0" err="1" smtClean="0"/>
+              <a:rPr lang="en-US" sz="3200" dirty="0" err="1"/>
               <a:t>Tuskugee</a:t>
             </a:r>
             <a:r>
-              <a:rPr lang="en-US" sz="3200" dirty="0" smtClean="0"/>
+              <a:rPr lang="en-US" sz="3200" dirty="0"/>
               <a:t> Institute survey, 1882-1968:</a:t>
             </a:r>
           </a:p>
@@ -5598,7 +5461,7 @@
               <a:buChar char="•"/>
             </a:pPr>
             <a:r>
-              <a:rPr lang="en-US" sz="3200" dirty="0" smtClean="0"/>
+              <a:rPr lang="en-US" sz="3200" dirty="0"/>
               <a:t>1297 whites lynched</a:t>
             </a:r>
           </a:p>
@@ -5608,10 +5471,9 @@
               <a:buChar char="•"/>
             </a:pPr>
             <a:r>
-              <a:rPr lang="en-US" sz="3200" dirty="0" smtClean="0"/>
+              <a:rPr lang="en-US" sz="3200" dirty="0"/>
               <a:t>3446 blacks lynched</a:t>
             </a:r>
-            <a:endParaRPr lang="en-US" sz="3200" dirty="0"/>
           </a:p>
         </p:txBody>
       </p:sp>
@@ -5625,13 +5487,6 @@
   <p:clrMapOvr>
     <a:masterClrMapping/>
   </p:clrMapOvr>
-  <p:timing>
-    <p:tnLst>
-      <p:par>
-        <p:cTn id="1" dur="indefinite" restart="never" nodeType="tmRoot"/>
-      </p:par>
-    </p:tnLst>
-  </p:timing>
 </p:sld>
 </file>
 
@@ -5675,78 +5530,65 @@
           <a:lstStyle/>
           <a:p>
             <a:r>
-              <a:rPr lang="en-US" dirty="0" smtClean="0"/>
+              <a:rPr lang="en-US" dirty="0"/>
               <a:t>Out of these great difficulties emerged the blues:</a:t>
             </a:r>
           </a:p>
           <a:p>
             <a:r>
-              <a:rPr lang="en-US" dirty="0" smtClean="0"/>
+              <a:rPr lang="en-US" dirty="0"/>
               <a:t>Charley Patton</a:t>
             </a:r>
           </a:p>
           <a:p>
             <a:r>
-              <a:rPr lang="en-US" dirty="0" smtClean="0"/>
+              <a:rPr lang="en-US" dirty="0"/>
               <a:t>Eddie “Sun” House</a:t>
             </a:r>
           </a:p>
           <a:p>
             <a:r>
-              <a:rPr lang="en-US" dirty="0" smtClean="0"/>
-              <a:t>Robert Johnson (1911</a:t>
-            </a:r>
-            <a:r>
               <a:rPr lang="en-US" dirty="0"/>
-              <a:t>-</a:t>
-            </a:r>
-            <a:r>
-              <a:rPr lang="en-US" dirty="0" smtClean="0"/>
-              <a:t>1938) :</a:t>
+              <a:t>Robert Johnson (1911-1938) :</a:t>
             </a:r>
           </a:p>
           <a:p>
             <a:pPr lvl="1"/>
             <a:r>
-              <a:rPr lang="en-US" dirty="0" smtClean="0"/>
+              <a:rPr lang="en-US" dirty="0"/>
               <a:t>Itinerant, tragic personal life</a:t>
             </a:r>
-            <a:endParaRPr lang="en-US" dirty="0"/>
           </a:p>
           <a:p>
             <a:pPr lvl="1"/>
             <a:r>
-              <a:rPr lang="en-US" dirty="0" smtClean="0"/>
+              <a:rPr lang="en-US" dirty="0"/>
               <a:t>Lots of legends</a:t>
             </a:r>
           </a:p>
           <a:p>
             <a:pPr lvl="1"/>
             <a:r>
-              <a:rPr lang="en-US" dirty="0" smtClean="0"/>
+              <a:rPr lang="en-US" dirty="0"/>
               <a:t>Juke joints performer</a:t>
             </a:r>
           </a:p>
           <a:p>
             <a:pPr lvl="1"/>
             <a:r>
-              <a:rPr lang="en-US" dirty="0" smtClean="0"/>
+              <a:rPr lang="en-US" dirty="0"/>
               <a:t>“Crossroads”, “Sweet Home Chicago”</a:t>
             </a:r>
           </a:p>
           <a:p>
             <a:pPr lvl="1"/>
             <a:r>
-              <a:rPr lang="en-US" i="1" dirty="0" smtClean="0"/>
+              <a:rPr lang="en-US" i="1" dirty="0"/>
               <a:t>King of the Delta Blues Singers </a:t>
             </a:r>
             <a:r>
-              <a:rPr lang="en-US" dirty="0" smtClean="0"/>
-              <a:t>(compiled and released in 1961)</a:t>
-            </a:r>
-            <a:r>
               <a:rPr lang="en-US" dirty="0"/>
-              <a:t> [</a:t>
+              <a:t>(compiled and released in 1961) [</a:t>
             </a:r>
             <a:r>
               <a:rPr lang="en-US" dirty="0">
@@ -5758,12 +5600,11 @@
               <a:rPr lang="en-US" dirty="0"/>
               <a:t>]</a:t>
             </a:r>
-            <a:endParaRPr lang="en-US" dirty="0" smtClean="0"/>
           </a:p>
           <a:p>
             <a:pPr lvl="1"/>
             <a:r>
-              <a:rPr lang="en-US" dirty="0" smtClean="0"/>
+              <a:rPr lang="en-US" dirty="0"/>
               <a:t>Died young, poisoned at a Juke Joint.</a:t>
             </a:r>
           </a:p>
@@ -5791,7 +5632,7 @@
           <a:p>
             <a:pPr algn="ctr"/>
             <a:r>
-              <a:rPr lang="en-US" sz="8000" dirty="0" smtClean="0">
+              <a:rPr lang="en-US" sz="8000" dirty="0">
                 <a:solidFill>
                   <a:schemeClr val="accent6">
                     <a:lumMod val="75000"/>
@@ -5800,13 +5641,6 @@
               </a:rPr>
               <a:t>The Blues</a:t>
             </a:r>
-            <a:endParaRPr lang="en-US" sz="8000" dirty="0">
-              <a:solidFill>
-                <a:schemeClr val="accent6">
-                  <a:lumMod val="75000"/>
-                </a:schemeClr>
-              </a:solidFill>
-            </a:endParaRPr>
           </a:p>
         </p:txBody>
       </p:sp>
@@ -5856,13 +5690,6 @@
   <p:clrMapOvr>
     <a:masterClrMapping/>
   </p:clrMapOvr>
-  <p:timing>
-    <p:tnLst>
-      <p:par>
-        <p:cTn id="1" dur="indefinite" restart="never" nodeType="tmRoot"/>
-      </p:par>
-    </p:tnLst>
-  </p:timing>
 </p:sld>
 </file>
 
@@ -5908,33 +5735,22 @@
                   </a:schemeClr>
                 </a:solidFill>
               </a:rPr>
-              <a:t>The </a:t>
-            </a:r>
-            <a:r>
-              <a:rPr lang="en-US" sz="4400" dirty="0" smtClean="0">
-                <a:solidFill>
-                  <a:schemeClr val="accent6">
-                    <a:lumMod val="75000"/>
-                  </a:schemeClr>
-                </a:solidFill>
-              </a:rPr>
-              <a:t>Blues: </a:t>
-            </a:r>
-            <a:r>
-              <a:rPr lang="en-US" dirty="0" smtClean="0"/>
+              <a:t>The Blues: </a:t>
+            </a:r>
+            <a:r>
+              <a:rPr lang="en-US" dirty="0"/>
               <a:t>Robert Johnson, </a:t>
             </a:r>
             <a:r>
-              <a:rPr lang="en-US" i="1" dirty="0" smtClean="0">
+              <a:rPr lang="en-US" i="1" dirty="0">
                 <a:hlinkClick r:id="rId3"/>
               </a:rPr>
               <a:t>King of the Delta Blues Singers</a:t>
             </a:r>
             <a:r>
-              <a:rPr lang="en-US" dirty="0" smtClean="0"/>
+              <a:rPr lang="en-US" dirty="0"/>
               <a:t>, 1961</a:t>
             </a:r>
-            <a:endParaRPr lang="en-US" dirty="0"/>
           </a:p>
         </p:txBody>
       </p:sp>
@@ -5975,13 +5791,6 @@
   <p:clrMapOvr>
     <a:masterClrMapping/>
   </p:clrMapOvr>
-  <p:timing>
-    <p:tnLst>
-      <p:par>
-        <p:cTn id="1" dur="indefinite" restart="never" nodeType="tmRoot"/>
-      </p:par>
-    </p:tnLst>
-  </p:timing>
 </p:sld>
 </file>
 
@@ -6023,34 +5832,46 @@
           <a:lstStyle/>
           <a:p>
             <a:r>
-              <a:rPr lang="en-US" dirty="0" smtClean="0"/>
+              <a:rPr lang="en-US" dirty="0"/>
+              <a:t>What is history?</a:t>
+            </a:r>
+          </a:p>
+          <a:p>
+            <a:pPr lvl="1"/>
+            <a:r>
+              <a:rPr lang="en-US" dirty="0"/>
+              <a:t>The past</a:t>
+            </a:r>
+          </a:p>
+          <a:p>
+            <a:r>
+              <a:rPr lang="en-US" dirty="0"/>
               <a:t>What is music?</a:t>
             </a:r>
           </a:p>
           <a:p>
-            <a:endParaRPr lang="en-US" dirty="0" smtClean="0"/>
-          </a:p>
-          <a:p>
             <a:endParaRPr lang="en-US" dirty="0"/>
           </a:p>
           <a:p>
-            <a:r>
-              <a:rPr lang="en-US" dirty="0" smtClean="0"/>
+            <a:endParaRPr lang="en-US" dirty="0"/>
+          </a:p>
+          <a:p>
+            <a:r>
+              <a:rPr lang="en-US" dirty="0"/>
               <a:t>What is Rock and Roll  music?</a:t>
             </a:r>
           </a:p>
           <a:p>
-            <a:endParaRPr lang="en-US" dirty="0" smtClean="0"/>
-          </a:p>
-          <a:p>
-            <a:endParaRPr lang="en-US" dirty="0" smtClean="0"/>
-          </a:p>
-          <a:p>
-            <a:r>
-              <a:rPr lang="en-US" dirty="0" smtClean="0"/>
+            <a:endParaRPr lang="en-US" dirty="0"/>
+          </a:p>
+          <a:p>
+            <a:endParaRPr lang="en-US" dirty="0"/>
+          </a:p>
+          <a:p>
+            <a:r>
+              <a:rPr lang="en-US" dirty="0"/>
               <a:t>Why do we like it?</a:t>
             </a:r>
-            <a:endParaRPr lang="en-US" dirty="0"/>
           </a:p>
         </p:txBody>
       </p:sp>
@@ -6070,10 +5891,9 @@
           <a:lstStyle/>
           <a:p>
             <a:r>
-              <a:rPr lang="en-US" dirty="0" smtClean="0"/>
+              <a:rPr lang="en-US" dirty="0"/>
               <a:t>Introduction</a:t>
             </a:r>
-            <a:endParaRPr lang="en-US" dirty="0"/>
           </a:p>
         </p:txBody>
       </p:sp>
@@ -6082,13 +5902,6 @@
   <p:clrMapOvr>
     <a:masterClrMapping/>
   </p:clrMapOvr>
-  <p:timing>
-    <p:tnLst>
-      <p:par>
-        <p:cTn id="1" dur="indefinite" restart="never" nodeType="tmRoot"/>
-      </p:par>
-    </p:tnLst>
-  </p:timing>
 </p:sld>
 </file>
 
@@ -6130,41 +5943,41 @@
           <a:lstStyle/>
           <a:p>
             <a:r>
-              <a:rPr lang="en-US" dirty="0" smtClean="0"/>
+              <a:rPr lang="en-US" dirty="0"/>
               <a:t>Came from Negro Spirituals</a:t>
             </a:r>
           </a:p>
           <a:p>
             <a:r>
-              <a:rPr lang="en-US" dirty="0" smtClean="0"/>
+              <a:rPr lang="en-US" dirty="0"/>
               <a:t>Crucial to the emergence of:</a:t>
             </a:r>
           </a:p>
           <a:p>
             <a:pPr lvl="1"/>
             <a:r>
-              <a:rPr lang="en-US" dirty="0" smtClean="0"/>
+              <a:rPr lang="en-US" dirty="0"/>
               <a:t>Jazz</a:t>
             </a:r>
           </a:p>
           <a:p>
             <a:pPr lvl="1"/>
             <a:r>
-              <a:rPr lang="en-US" dirty="0" smtClean="0"/>
+              <a:rPr lang="en-US" dirty="0"/>
               <a:t>Electric Blues</a:t>
             </a:r>
           </a:p>
           <a:p>
             <a:pPr lvl="1"/>
             <a:r>
-              <a:rPr lang="en-US" dirty="0" smtClean="0"/>
+              <a:rPr lang="en-US" dirty="0"/>
               <a:t>Rhythm and Blues</a:t>
             </a:r>
           </a:p>
           <a:p>
             <a:pPr lvl="1"/>
             <a:r>
-              <a:rPr lang="en-US" dirty="0" smtClean="0"/>
+              <a:rPr lang="en-US" dirty="0"/>
               <a:t>Rock and Roll</a:t>
             </a:r>
           </a:p>
@@ -6196,23 +6009,12 @@
                   </a:schemeClr>
                 </a:solidFill>
               </a:rPr>
-              <a:t>The </a:t>
-            </a:r>
-            <a:r>
-              <a:rPr lang="en-US" sz="4400" dirty="0" smtClean="0">
-                <a:solidFill>
-                  <a:schemeClr val="accent6">
-                    <a:lumMod val="75000"/>
-                  </a:schemeClr>
-                </a:solidFill>
-              </a:rPr>
-              <a:t>Blues: </a:t>
-            </a:r>
-            <a:r>
-              <a:rPr lang="en-US" dirty="0" smtClean="0"/>
+              <a:t>The Blues: </a:t>
+            </a:r>
+            <a:r>
+              <a:rPr lang="en-US" dirty="0"/>
               <a:t>The legacies of the Blues</a:t>
             </a:r>
-            <a:endParaRPr lang="en-US" dirty="0"/>
           </a:p>
         </p:txBody>
       </p:sp>
@@ -6282,19 +6084,19 @@
           <a:lstStyle/>
           <a:p>
             <a:r>
-              <a:rPr lang="en-US" dirty="0" smtClean="0"/>
+              <a:rPr lang="en-US" dirty="0"/>
               <a:t>Big Bill </a:t>
             </a:r>
             <a:r>
-              <a:rPr lang="en-US" dirty="0" err="1" smtClean="0"/>
+              <a:rPr lang="en-US" dirty="0" err="1"/>
               <a:t>Broonzy</a:t>
             </a:r>
             <a:r>
-              <a:rPr lang="en-US" dirty="0" smtClean="0"/>
+              <a:rPr lang="en-US" dirty="0"/>
               <a:t>, 1957, </a:t>
             </a:r>
             <a:r>
-              <a:rPr lang="en-US" dirty="0" smtClean="0">
+              <a:rPr lang="en-US" dirty="0">
                 <a:hlinkClick r:id="rId4"/>
               </a:rPr>
               <a:t>link</a:t>
@@ -6436,13 +6238,13 @@
           <a:lstStyle/>
           <a:p>
             <a:r>
-              <a:rPr lang="en-US" dirty="0" smtClean="0"/>
+              <a:rPr lang="en-US" dirty="0"/>
               <a:t>Capitalism!</a:t>
             </a:r>
           </a:p>
           <a:p>
             <a:r>
-              <a:rPr lang="en-US" dirty="0" smtClean="0"/>
+              <a:rPr lang="en-US" dirty="0"/>
               <a:t>Increased travel and migration, especially southern blacks to northern cities (Chicago).</a:t>
             </a:r>
           </a:p>
@@ -6454,29 +6256,13 @@
           </a:p>
           <a:p>
             <a:r>
-              <a:rPr lang="en-US" dirty="0" smtClean="0"/>
-              <a:t>1894: </a:t>
-            </a:r>
-            <a:r>
               <a:rPr lang="en-US" dirty="0"/>
-              <a:t>Sears, Roebuck &amp; Co</a:t>
-            </a:r>
-            <a:r>
-              <a:rPr lang="en-US" dirty="0" smtClean="0"/>
-              <a:t>. catalogue begins selling guitars: price </a:t>
-            </a:r>
+              <a:t>1894: Sears, Roebuck &amp; Co. catalogue begins selling guitars: price $4.50 to $26.00</a:t>
+            </a:r>
+          </a:p>
+          <a:p>
             <a:r>
               <a:rPr lang="en-US" dirty="0"/>
-              <a:t>$4.50 to $</a:t>
-            </a:r>
-            <a:r>
-              <a:rPr lang="en-US" dirty="0" smtClean="0"/>
-              <a:t>26.00</a:t>
-            </a:r>
-          </a:p>
-          <a:p>
-            <a:r>
-              <a:rPr lang="en-US" dirty="0" smtClean="0"/>
               <a:t>African Kora - banjo</a:t>
             </a:r>
           </a:p>
@@ -6509,10 +6295,9 @@
           <a:lstStyle/>
           <a:p>
             <a:r>
-              <a:rPr lang="en-US" dirty="0" smtClean="0"/>
+              <a:rPr lang="en-US" dirty="0"/>
               <a:t>Rise of Popular Music	</a:t>
             </a:r>
-            <a:endParaRPr lang="en-US" dirty="0"/>
           </a:p>
         </p:txBody>
       </p:sp>
@@ -6566,13 +6351,6 @@
   <p:clrMapOvr>
     <a:masterClrMapping/>
   </p:clrMapOvr>
-  <p:timing>
-    <p:tnLst>
-      <p:par>
-        <p:cTn id="1" dur="indefinite" restart="never" nodeType="tmRoot"/>
-      </p:par>
-    </p:tnLst>
-  </p:timing>
 </p:sld>
 </file>
 
@@ -6621,18 +6399,18 @@
           <a:lstStyle/>
           <a:p>
             <a:r>
-              <a:rPr lang="en-US" dirty="0" smtClean="0"/>
+              <a:rPr lang="en-US" dirty="0"/>
               <a:t>West African Culture, mostly from Senegal and Gambia</a:t>
             </a:r>
           </a:p>
           <a:p>
             <a:r>
-              <a:rPr lang="en-US" dirty="0" smtClean="0"/>
+              <a:rPr lang="en-US" dirty="0"/>
               <a:t>African drums, repeated rhythms, and dancing.</a:t>
             </a:r>
           </a:p>
           <a:p>
-            <a:endParaRPr lang="en-US" dirty="0" smtClean="0"/>
+            <a:endParaRPr lang="en-US" dirty="0"/>
           </a:p>
           <a:p>
             <a:endParaRPr lang="en-US" dirty="0"/>
@@ -6704,13 +6482,6 @@
   <p:clrMapOvr>
     <a:masterClrMapping/>
   </p:clrMapOvr>
-  <p:timing>
-    <p:tnLst>
-      <p:par>
-        <p:cTn id="1" dur="indefinite" restart="never" nodeType="tmRoot"/>
-      </p:par>
-    </p:tnLst>
-  </p:timing>
 </p:sld>
 </file>
 
@@ -6790,18 +6561,17 @@
           <a:p>
             <a:pPr algn="ctr"/>
             <a:r>
-              <a:rPr lang="en-US" sz="2800" dirty="0" smtClean="0"/>
+              <a:rPr lang="en-US" sz="2800" dirty="0"/>
               <a:t>Traditional </a:t>
             </a:r>
             <a:r>
-              <a:rPr lang="en-US" sz="2800" dirty="0" err="1" smtClean="0"/>
+              <a:rPr lang="en-US" sz="2800" dirty="0" err="1"/>
               <a:t>Senagalaise</a:t>
             </a:r>
             <a:r>
-              <a:rPr lang="en-US" sz="2800" dirty="0" smtClean="0"/>
+              <a:rPr lang="en-US" sz="2800" dirty="0"/>
               <a:t> Djembe Drummers</a:t>
             </a:r>
-            <a:endParaRPr lang="en-US" sz="2800" dirty="0"/>
           </a:p>
         </p:txBody>
       </p:sp>
@@ -6815,13 +6585,6 @@
   <p:clrMapOvr>
     <a:masterClrMapping/>
   </p:clrMapOvr>
-  <p:timing>
-    <p:tnLst>
-      <p:par>
-        <p:cTn id="1" dur="indefinite" restart="never" nodeType="tmRoot"/>
-      </p:par>
-    </p:tnLst>
-  </p:timing>
 </p:sld>
 </file>
 
@@ -6860,62 +6623,62 @@
           <a:lstStyle/>
           <a:p>
             <a:r>
-              <a:rPr lang="en-US" dirty="0" smtClean="0"/>
+              <a:rPr lang="en-US" dirty="0"/>
               <a:t>Trans-Atlantic Slave Trade:</a:t>
             </a:r>
           </a:p>
           <a:p>
             <a:pPr lvl="1"/>
             <a:r>
-              <a:rPr lang="en-US" dirty="0" smtClean="0"/>
+              <a:rPr lang="en-US" dirty="0"/>
               <a:t>1525-1866: 12.5 million slaves shipped to the “New World”.</a:t>
             </a:r>
           </a:p>
           <a:p>
             <a:pPr lvl="1"/>
             <a:r>
-              <a:rPr lang="en-US" dirty="0" smtClean="0"/>
+              <a:rPr lang="en-US" dirty="0"/>
               <a:t>10.7 million survived the voyage: “Middle Passage”</a:t>
             </a:r>
           </a:p>
           <a:p>
             <a:pPr lvl="1"/>
             <a:r>
-              <a:rPr lang="en-US" dirty="0" smtClean="0"/>
+              <a:rPr lang="en-US" dirty="0"/>
               <a:t>Only 388,000 shipped to North America (3,63%).</a:t>
             </a:r>
           </a:p>
           <a:p>
             <a:pPr lvl="1"/>
             <a:r>
-              <a:rPr lang="en-US" dirty="0" smtClean="0"/>
+              <a:rPr lang="en-US" dirty="0"/>
               <a:t>Another 60-70,000 migrated from central America.</a:t>
             </a:r>
           </a:p>
           <a:p>
             <a:r>
-              <a:rPr lang="en-US" dirty="0" smtClean="0"/>
+              <a:rPr lang="en-US" dirty="0"/>
               <a:t>Slavery: </a:t>
             </a:r>
           </a:p>
           <a:p>
             <a:pPr lvl="1"/>
             <a:r>
-              <a:rPr lang="en-US" dirty="0" smtClean="0"/>
+              <a:rPr lang="en-US" dirty="0"/>
               <a:t>ancient institution</a:t>
             </a:r>
           </a:p>
           <a:p>
             <a:pPr lvl="1"/>
             <a:r>
-              <a:rPr lang="en-US" dirty="0" smtClean="0"/>
+              <a:rPr lang="en-US" dirty="0"/>
               <a:t>American slavery particularly oppressive, brutal, and crucial to the cash crop economy of new world.</a:t>
             </a:r>
           </a:p>
           <a:p>
             <a:pPr lvl="1"/>
             <a:r>
-              <a:rPr lang="en-US" dirty="0" smtClean="0"/>
+              <a:rPr lang="en-US" dirty="0"/>
               <a:t>Embedded in the minds of European settlers and offspring.</a:t>
             </a:r>
           </a:p>
@@ -6958,13 +6721,6 @@
   <p:clrMapOvr>
     <a:masterClrMapping/>
   </p:clrMapOvr>
-  <p:timing>
-    <p:tnLst>
-      <p:par>
-        <p:cTn id="1" dur="indefinite" restart="never" nodeType="tmRoot"/>
-      </p:par>
-    </p:tnLst>
-  </p:timing>
 </p:sld>
 </file>
 
@@ -7006,42 +6762,25 @@
           <a:lstStyle/>
           <a:p>
             <a:r>
-              <a:rPr lang="en-US" dirty="0" smtClean="0"/>
+              <a:rPr lang="en-US" dirty="0"/>
               <a:t>Slaves were converted to Christianity.</a:t>
             </a:r>
           </a:p>
           <a:p>
             <a:r>
-              <a:rPr lang="en-US" dirty="0" smtClean="0"/>
+              <a:rPr lang="en-US" dirty="0"/>
               <a:t>Adopted Christian hymns.</a:t>
             </a:r>
-            <a:endParaRPr lang="en-US" dirty="0"/>
-          </a:p>
-          <a:p>
-            <a:r>
-              <a:rPr lang="en-US" dirty="0" smtClean="0"/>
-              <a:t>Written </a:t>
-            </a:r>
+          </a:p>
+          <a:p>
             <a:r>
               <a:rPr lang="en-US" dirty="0"/>
-              <a:t>by Charles Wesley (1707–1788), one of </a:t>
-            </a:r>
-            <a:r>
-              <a:rPr lang="en-US" dirty="0" smtClean="0"/>
-              <a:t>5000 </a:t>
-            </a:r>
+              <a:t>Written by Charles Wesley (1707–1788), one of 5000 songs he wrote.</a:t>
+            </a:r>
+          </a:p>
+          <a:p>
             <a:r>
               <a:rPr lang="en-US" dirty="0"/>
-              <a:t>songs he </a:t>
-            </a:r>
-            <a:r>
-              <a:rPr lang="en-US" dirty="0" smtClean="0"/>
-              <a:t>wrote.</a:t>
-            </a:r>
-          </a:p>
-          <a:p>
-            <a:r>
-              <a:rPr lang="en-US" dirty="0" smtClean="0"/>
               <a:t>“Bard of Methodism”</a:t>
             </a:r>
           </a:p>
@@ -7115,13 +6854,6 @@
   <p:clrMapOvr>
     <a:masterClrMapping/>
   </p:clrMapOvr>
-  <p:timing>
-    <p:tnLst>
-      <p:par>
-        <p:cTn id="1" dur="indefinite" restart="never" nodeType="tmRoot"/>
-      </p:par>
-    </p:tnLst>
-  </p:timing>
 </p:sld>
 </file>
 
@@ -7187,20 +6919,14 @@
           <a:lstStyle/>
           <a:p>
             <a:r>
-              <a:rPr lang="en-US" dirty="0" smtClean="0"/>
+              <a:rPr lang="en-US" dirty="0"/>
               <a:t>Charles Wesley, “</a:t>
             </a:r>
             <a:r>
               <a:rPr lang="en-US" dirty="0">
                 <a:effectLst/>
               </a:rPr>
-              <a:t>Hail The Day That Sees Him </a:t>
-            </a:r>
-            <a:r>
-              <a:rPr lang="en-US" dirty="0" smtClean="0">
-                <a:effectLst/>
-              </a:rPr>
-              <a:t>Rise,” 1739</a:t>
+              <a:t>Hail The Day That Sees Him Rise,” 1739</a:t>
             </a:r>
             <a:endParaRPr lang="en-US" dirty="0"/>
           </a:p>
@@ -7216,13 +6942,6 @@
   <p:clrMapOvr>
     <a:masterClrMapping/>
   </p:clrMapOvr>
-  <p:timing>
-    <p:tnLst>
-      <p:par>
-        <p:cTn id="1" dur="indefinite" restart="never" nodeType="tmRoot"/>
-      </p:par>
-    </p:tnLst>
-  </p:timing>
 </p:sld>
 </file>
 
@@ -7279,16 +6998,6 @@
           <a:lstStyle/>
           <a:p>
             <a:r>
-              <a:rPr lang="en-US" dirty="0" smtClean="0">
-                <a:solidFill>
-                  <a:schemeClr val="tx2">
-                    <a:lumMod val="25000"/>
-                  </a:schemeClr>
-                </a:solidFill>
-              </a:rPr>
-              <a:t>Slavery changed African slaves’ music: </a:t>
-            </a:r>
-            <a:r>
               <a:rPr lang="en-US" dirty="0">
                 <a:solidFill>
                   <a:schemeClr val="tx2">
@@ -7296,20 +7005,10 @@
                   </a:schemeClr>
                 </a:solidFill>
               </a:rPr>
-              <a:t>no drums allowed, so slapping, clapping, and singing.</a:t>
-            </a:r>
-          </a:p>
-          <a:p>
-            <a:r>
-              <a:rPr lang="en-US" dirty="0" smtClean="0">
-                <a:solidFill>
-                  <a:schemeClr val="tx2">
-                    <a:lumMod val="25000"/>
-                  </a:schemeClr>
-                </a:solidFill>
-              </a:rPr>
-              <a:t>Christian music dramatically </a:t>
-            </a:r>
+              <a:t>Slavery changed African slaves’ music: no drums allowed, so slapping, clapping, and singing.</a:t>
+            </a:r>
+          </a:p>
+          <a:p>
             <a:r>
               <a:rPr lang="en-US" dirty="0">
                 <a:solidFill>
@@ -7318,7 +7017,7 @@
                   </a:schemeClr>
                 </a:solidFill>
               </a:rPr>
-              <a:t>changed by African American singers.</a:t>
+              <a:t>Christian music dramatically changed by African American singers.</a:t>
             </a:r>
           </a:p>
           <a:p>
@@ -7349,7 +7048,7 @@
               <a:t>link</a:t>
             </a:r>
             <a:r>
-              <a:rPr lang="en-US" dirty="0" smtClean="0">
+              <a:rPr lang="en-US" dirty="0">
                 <a:solidFill>
                   <a:schemeClr val="tx2">
                     <a:lumMod val="25000"/>
@@ -7449,13 +7148,6 @@
   <p:clrMapOvr>
     <a:masterClrMapping/>
   </p:clrMapOvr>
-  <p:timing>
-    <p:tnLst>
-      <p:par>
-        <p:cTn id="1" dur="indefinite" restart="never" nodeType="tmRoot"/>
-      </p:par>
-    </p:tnLst>
-  </p:timing>
 </p:sld>
 </file>
 
@@ -7502,122 +7194,9 @@
               <a:buNone/>
             </a:pPr>
             <a:r>
-              <a:rPr lang="en-US" dirty="0" smtClean="0"/>
-              <a:t>“</a:t>
-            </a:r>
-            <a:r>
               <a:rPr lang="en-US" dirty="0"/>
-              <a:t>These were sung in </a:t>
-            </a:r>
-            <a:r>
-              <a:rPr lang="en-US" dirty="0" smtClean="0"/>
-              <a:t>the white </a:t>
-            </a:r>
-            <a:r>
-              <a:rPr lang="en-US" dirty="0"/>
-              <a:t>congregations of the South, and were found </a:t>
-            </a:r>
-            <a:r>
-              <a:rPr lang="en-US" dirty="0" smtClean="0"/>
-              <a:t>in old </a:t>
-            </a:r>
-            <a:r>
-              <a:rPr lang="en-US" dirty="0"/>
-              <a:t>religious song-books, which, though published </a:t>
-            </a:r>
-            <a:r>
-              <a:rPr lang="en-US" dirty="0" smtClean="0"/>
-              <a:t>by individual </a:t>
-            </a:r>
-            <a:r>
-              <a:rPr lang="en-US" dirty="0"/>
-              <a:t>enterprise rather than upon </a:t>
-            </a:r>
-            <a:r>
-              <a:rPr lang="en-US" dirty="0" smtClean="0"/>
-              <a:t>denominational authority</a:t>
-            </a:r>
-            <a:r>
-              <a:rPr lang="en-US" dirty="0"/>
-              <a:t>, had considerable circulation. These </a:t>
-            </a:r>
-            <a:r>
-              <a:rPr lang="en-US" dirty="0" smtClean="0"/>
-              <a:t>stirring devotional </a:t>
-            </a:r>
-            <a:r>
-              <a:rPr lang="en-US" dirty="0"/>
-              <a:t>hymns, with their well adapted tunes, </a:t>
-            </a:r>
-            <a:r>
-              <a:rPr lang="en-US" dirty="0" smtClean="0"/>
-              <a:t>the colored </a:t>
-            </a:r>
-            <a:r>
-              <a:rPr lang="en-US" dirty="0"/>
-              <a:t>people attendant upon the white </a:t>
-            </a:r>
-            <a:r>
-              <a:rPr lang="en-US" dirty="0" smtClean="0"/>
-              <a:t>congregations memorized</a:t>
-            </a:r>
-            <a:r>
-              <a:rPr lang="en-US" dirty="0"/>
-              <a:t>, loved, and adopted. Not being able </a:t>
-            </a:r>
-            <a:r>
-              <a:rPr lang="en-US" dirty="0" smtClean="0"/>
-              <a:t>to read</a:t>
-            </a:r>
-            <a:r>
-              <a:rPr lang="en-US" dirty="0"/>
-              <a:t>, and, therefore, unable to correct their </a:t>
-            </a:r>
-            <a:r>
-              <a:rPr lang="en-US" dirty="0" smtClean="0"/>
-              <a:t>recollections by </a:t>
-            </a:r>
-            <a:r>
-              <a:rPr lang="en-US" dirty="0"/>
-              <a:t>reference to the printed page, they often </a:t>
-            </a:r>
-            <a:r>
-              <a:rPr lang="en-US" dirty="0" smtClean="0"/>
-              <a:t>confused both </a:t>
-            </a:r>
-            <a:r>
-              <a:rPr lang="en-US" dirty="0"/>
-              <a:t>the sense and the verses — thus </a:t>
-            </a:r>
-            <a:r>
-              <a:rPr lang="en-US" dirty="0" smtClean="0"/>
-              <a:t>bringing these "revival songs" </a:t>
-            </a:r>
-            <a:r>
-              <a:rPr lang="en-US" dirty="0"/>
-              <a:t>of their adoption to </a:t>
-            </a:r>
-            <a:r>
-              <a:rPr lang="en-US" dirty="0" smtClean="0"/>
-              <a:t>partake more </a:t>
-            </a:r>
-            <a:r>
-              <a:rPr lang="en-US" dirty="0"/>
-              <a:t>or less of the character of those which were </a:t>
-            </a:r>
-            <a:r>
-              <a:rPr lang="en-US" dirty="0" smtClean="0"/>
-              <a:t>entirely of </a:t>
-            </a:r>
-            <a:r>
-              <a:rPr lang="en-US" dirty="0"/>
-              <a:t>their own invention</a:t>
-            </a:r>
-            <a:r>
-              <a:rPr lang="en-US" dirty="0" smtClean="0"/>
-              <a:t>.”</a:t>
-            </a:r>
-            <a:endParaRPr lang="en-US" dirty="0"/>
+              <a:t>“These were sung in the white congregations of the South, and were found in old religious song-books, which, though published by individual enterprise rather than upon denominational authority, had considerable circulation. These stirring devotional hymns, with their well adapted tunes, the colored people attendant upon the white congregations memorized, loved, and adopted. Not being able to read, and, therefore, unable to correct their recollections by reference to the printed page, they often confused both the sense and the verses — thus bringing these "revival songs" of their adoption to partake more or less of the character of those which were entirely of their own invention.”</a:t>
+            </a:r>
           </a:p>
         </p:txBody>
       </p:sp>
@@ -7644,42 +7223,17 @@
           <a:lstStyle/>
           <a:p>
             <a:r>
-              <a:rPr lang="en-US" sz="2000" dirty="0" smtClean="0"/>
+              <a:rPr lang="en-US" sz="2000" dirty="0"/>
               <a:t>F. S. Hoyt, “Introduction,” in Marshall w. Taylor, </a:t>
             </a:r>
             <a:r>
-              <a:rPr lang="en-US" sz="2000" i="1" dirty="0" smtClean="0"/>
+              <a:rPr lang="en-US" sz="2000" i="1" dirty="0"/>
               <a:t>A Collection of Revival hymns  and Plantation Melodies </a:t>
             </a:r>
             <a:r>
-              <a:rPr lang="en-US" sz="2000" dirty="0" smtClean="0"/>
-              <a:t>(Cincinnati: </a:t>
-            </a:r>
-            <a:r>
               <a:rPr lang="en-US" sz="2000" dirty="0"/>
-              <a:t>M</a:t>
-            </a:r>
-            <a:r>
-              <a:rPr lang="en-US" sz="2000" dirty="0" smtClean="0"/>
-              <a:t>arshall </a:t>
-            </a:r>
-            <a:r>
-              <a:rPr lang="en-US" sz="2000" dirty="0"/>
-              <a:t>W</a:t>
-            </a:r>
-            <a:r>
-              <a:rPr lang="en-US" sz="2000" dirty="0" smtClean="0"/>
-              <a:t>. Taylor and W. C. Echols </a:t>
-            </a:r>
-            <a:r>
-              <a:rPr lang="en-US" sz="2000" dirty="0"/>
-              <a:t>P</a:t>
-            </a:r>
-            <a:r>
-              <a:rPr lang="en-US" sz="2000" dirty="0" smtClean="0"/>
-              <a:t>ublishers, 1882), p. 11.</a:t>
-            </a:r>
-            <a:endParaRPr lang="en-US" sz="2000" dirty="0"/>
+              <a:t>(Cincinnati: Marshall W. Taylor and W. C. Echols Publishers, 1882), p. 11.</a:t>
+            </a:r>
           </a:p>
         </p:txBody>
       </p:sp>
@@ -7693,13 +7247,6 @@
   <p:clrMapOvr>
     <a:masterClrMapping/>
   </p:clrMapOvr>
-  <p:timing>
-    <p:tnLst>
-      <p:par>
-        <p:cTn id="1" dur="indefinite" restart="never" nodeType="tmRoot"/>
-      </p:par>
-    </p:tnLst>
-  </p:timing>
 </p:sld>
 </file>
 

</xml_diff>

<commit_message>
updates to intro, 3 Jan 2018
</commit_message>
<xml_diff>
--- a/HSTR121/ppts/History_Rock_Intro.pptx
+++ b/HSTR121/ppts/History_Rock_Intro.pptx
@@ -234,7 +234,7 @@
             <a:fld id="{E28287AA-0D99-42CE-A71B-10FA9908BBF8}" type="datetimeFigureOut">
               <a:rPr lang="en-US" smtClean="0"/>
               <a:pPr/>
-              <a:t>1/2/2018</a:t>
+              <a:t>1/3/2018</a:t>
             </a:fld>
             <a:endParaRPr lang="en-US"/>
           </a:p>
@@ -1679,7 +1679,7 @@
             <a:fld id="{DCFA480D-CB17-4C49-BB2A-C7514E1C7CEA}" type="datetimeFigureOut">
               <a:rPr lang="en-US" smtClean="0"/>
               <a:pPr/>
-              <a:t>1/2/2018</a:t>
+              <a:t>1/3/2018</a:t>
             </a:fld>
             <a:endParaRPr lang="en-US"/>
           </a:p>
@@ -1845,7 +1845,7 @@
             <a:fld id="{DCFA480D-CB17-4C49-BB2A-C7514E1C7CEA}" type="datetimeFigureOut">
               <a:rPr lang="en-US" smtClean="0"/>
               <a:pPr/>
-              <a:t>1/2/2018</a:t>
+              <a:t>1/3/2018</a:t>
             </a:fld>
             <a:endParaRPr lang="en-US"/>
           </a:p>
@@ -2020,7 +2020,7 @@
             <a:fld id="{DCFA480D-CB17-4C49-BB2A-C7514E1C7CEA}" type="datetimeFigureOut">
               <a:rPr lang="en-US" smtClean="0"/>
               <a:pPr/>
-              <a:t>1/2/2018</a:t>
+              <a:t>1/3/2018</a:t>
             </a:fld>
             <a:endParaRPr lang="en-US"/>
           </a:p>
@@ -2169,7 +2169,7 @@
             <a:fld id="{DCFA480D-CB17-4C49-BB2A-C7514E1C7CEA}" type="datetimeFigureOut">
               <a:rPr lang="en-US" smtClean="0"/>
               <a:pPr/>
-              <a:t>1/2/2018</a:t>
+              <a:t>1/3/2018</a:t>
             </a:fld>
             <a:endParaRPr lang="en-US"/>
           </a:p>
@@ -2293,7 +2293,7 @@
             <a:fld id="{DCFA480D-CB17-4C49-BB2A-C7514E1C7CEA}" type="datetimeFigureOut">
               <a:rPr lang="en-US" smtClean="0"/>
               <a:pPr/>
-              <a:t>1/2/2018</a:t>
+              <a:t>1/3/2018</a:t>
             </a:fld>
             <a:endParaRPr lang="en-US" dirty="0"/>
           </a:p>
@@ -2565,7 +2565,7 @@
             <a:fld id="{DCFA480D-CB17-4C49-BB2A-C7514E1C7CEA}" type="datetimeFigureOut">
               <a:rPr lang="en-US" smtClean="0"/>
               <a:pPr/>
-              <a:t>1/2/2018</a:t>
+              <a:t>1/3/2018</a:t>
             </a:fld>
             <a:endParaRPr lang="en-US" dirty="0"/>
           </a:p>
@@ -2837,7 +2837,7 @@
             <a:fld id="{DCFA480D-CB17-4C49-BB2A-C7514E1C7CEA}" type="datetimeFigureOut">
               <a:rPr lang="en-US" smtClean="0"/>
               <a:pPr/>
-              <a:t>1/2/2018</a:t>
+              <a:t>1/3/2018</a:t>
             </a:fld>
             <a:endParaRPr lang="en-US" dirty="0"/>
           </a:p>
@@ -3285,7 +3285,7 @@
             <a:fld id="{DCFA480D-CB17-4C49-BB2A-C7514E1C7CEA}" type="datetimeFigureOut">
               <a:rPr lang="en-US" smtClean="0"/>
               <a:pPr/>
-              <a:t>1/2/2018</a:t>
+              <a:t>1/3/2018</a:t>
             </a:fld>
             <a:endParaRPr lang="en-US" dirty="0"/>
           </a:p>
@@ -3400,7 +3400,7 @@
             <a:fld id="{DCFA480D-CB17-4C49-BB2A-C7514E1C7CEA}" type="datetimeFigureOut">
               <a:rPr lang="en-US" smtClean="0"/>
               <a:pPr/>
-              <a:t>1/2/2018</a:t>
+              <a:t>1/3/2018</a:t>
             </a:fld>
             <a:endParaRPr lang="en-US" dirty="0"/>
           </a:p>
@@ -3652,7 +3652,7 @@
             <a:fld id="{DCFA480D-CB17-4C49-BB2A-C7514E1C7CEA}" type="datetimeFigureOut">
               <a:rPr lang="en-US" smtClean="0"/>
               <a:pPr/>
-              <a:t>1/2/2018</a:t>
+              <a:t>1/3/2018</a:t>
             </a:fld>
             <a:endParaRPr lang="en-US"/>
           </a:p>
@@ -3895,7 +3895,7 @@
             <a:fld id="{DCFA480D-CB17-4C49-BB2A-C7514E1C7CEA}" type="datetimeFigureOut">
               <a:rPr lang="en-US" smtClean="0"/>
               <a:pPr/>
-              <a:t>1/2/2018</a:t>
+              <a:t>1/3/2018</a:t>
             </a:fld>
             <a:endParaRPr lang="en-US"/>
           </a:p>
@@ -4071,7 +4071,7 @@
             <a:fld id="{DCFA480D-CB17-4C49-BB2A-C7514E1C7CEA}" type="datetimeFigureOut">
               <a:rPr lang="en-US" smtClean="0"/>
               <a:pPr/>
-              <a:t>1/2/2018</a:t>
+              <a:t>1/3/2018</a:t>
             </a:fld>
             <a:endParaRPr lang="en-US" sz="1200" dirty="0">
               <a:solidFill>
@@ -6888,7 +6888,7 @@
         <p:spPr/>
         <p:txBody>
           <a:bodyPr>
-            <a:normAutofit lnSpcReduction="10000"/>
+            <a:normAutofit fontScale="92500"/>
           </a:bodyPr>
           <a:lstStyle/>
           <a:p>
@@ -6926,6 +6926,13 @@
             </a:r>
           </a:p>
           <a:p>
+            <a:pPr lvl="1"/>
+            <a:r>
+              <a:rPr lang="en-US" dirty="0"/>
+              <a:t>But there were 4 million slaves by 1860.</a:t>
+            </a:r>
+          </a:p>
+          <a:p>
             <a:r>
               <a:rPr lang="en-US" dirty="0"/>
               <a:t>Slavery: </a:t>
@@ -6942,7 +6949,7 @@
             <a:pPr lvl="1"/>
             <a:r>
               <a:rPr lang="en-US" dirty="0"/>
-              <a:t>American slavery particularly oppressive, brutal, and crucial to the cash crop economy of new world.</a:t>
+              <a:t>American slavery particularly oppressive, brutal, and crucial to the cash crop economy of new world (cotton gin).</a:t>
             </a:r>
           </a:p>
           <a:p>

</xml_diff>

<commit_message>
added C. Patton and Sun House stuff
</commit_message>
<xml_diff>
--- a/HSTR121/ppts/History_Rock_Intro.pptx
+++ b/HSTR121/ppts/History_Rock_Intro.pptx
@@ -5,7 +5,7 @@
     <p:sldMasterId id="2147483660" r:id="rId2"/>
   </p:sldMasterIdLst>
   <p:notesMasterIdLst>
-    <p:notesMasterId r:id="rId25"/>
+    <p:notesMasterId r:id="rId26"/>
   </p:notesMasterIdLst>
   <p:sldIdLst>
     <p:sldId id="256" r:id="rId3"/>
@@ -26,10 +26,11 @@
     <p:sldId id="264" r:id="rId18"/>
     <p:sldId id="266" r:id="rId19"/>
     <p:sldId id="267" r:id="rId20"/>
-    <p:sldId id="274" r:id="rId21"/>
-    <p:sldId id="279" r:id="rId22"/>
-    <p:sldId id="268" r:id="rId23"/>
-    <p:sldId id="280" r:id="rId24"/>
+    <p:sldId id="281" r:id="rId21"/>
+    <p:sldId id="274" r:id="rId22"/>
+    <p:sldId id="279" r:id="rId23"/>
+    <p:sldId id="268" r:id="rId24"/>
+    <p:sldId id="280" r:id="rId25"/>
   </p:sldIdLst>
   <p:sldSz cx="9144000" cy="6858000" type="screen4x3"/>
   <p:notesSz cx="6858000" cy="9144000"/>
@@ -234,7 +235,7 @@
             <a:fld id="{E28287AA-0D99-42CE-A71B-10FA9908BBF8}" type="datetimeFigureOut">
               <a:rPr lang="en-US" smtClean="0"/>
               <a:pPr/>
-              <a:t>1/5/2018</a:t>
+              <a:t>1/8/2018</a:t>
             </a:fld>
             <a:endParaRPr lang="en-US"/>
           </a:p>
@@ -637,21 +638,8 @@
           <a:p>
             <a:r>
               <a:rPr lang="en-CA" dirty="0"/>
-              <a:t>Image source: </a:t>
-            </a:r>
-            <a:r>
-              <a:rPr lang="en-US" dirty="0"/>
-              <a:t>By </a:t>
-            </a:r>
-            <a:r>
-              <a:rPr lang="en-US" dirty="0" err="1"/>
-              <a:t>Beraldoleal</a:t>
-            </a:r>
-            <a:r>
-              <a:rPr lang="en-US" dirty="0"/>
-              <a:t> - Own work, CC BY 3.0, https://commons.wikimedia.org/w/index.php?curid=11836468</a:t>
-            </a:r>
-            <a:endParaRPr lang="en-CA" dirty="0"/>
+              <a:t>Photo source: http://www.harmonytalk.com/archives/2005_12.html</a:t>
+            </a:r>
           </a:p>
         </p:txBody>
       </p:sp>
@@ -673,7 +661,108 @@
             <a:fld id="{D7C167DB-EFF0-400D-96A1-6799F871DE5B}" type="slidenum">
               <a:rPr lang="en-US" smtClean="0"/>
               <a:pPr/>
-              <a:t>22</a:t>
+              <a:t>18</a:t>
+            </a:fld>
+            <a:endParaRPr lang="en-US"/>
+          </a:p>
+        </p:txBody>
+      </p:sp>
+    </p:spTree>
+    <p:extLst>
+      <p:ext uri="{BB962C8B-B14F-4D97-AF65-F5344CB8AC3E}">
+        <p14:creationId xmlns:p14="http://schemas.microsoft.com/office/powerpoint/2010/main" val="3076294886"/>
+      </p:ext>
+    </p:extLst>
+  </p:cSld>
+  <p:clrMapOvr>
+    <a:masterClrMapping/>
+  </p:clrMapOvr>
+</p:notes>
+</file>
+
+<file path=ppt/notesSlides/notesSlide11.xml><?xml version="1.0" encoding="utf-8"?>
+<p:notes xmlns:a="http://schemas.openxmlformats.org/drawingml/2006/main" xmlns:r="http://schemas.openxmlformats.org/officeDocument/2006/relationships" xmlns:p="http://schemas.openxmlformats.org/presentationml/2006/main">
+  <p:cSld>
+    <p:spTree>
+      <p:nvGrpSpPr>
+        <p:cNvPr id="1" name=""/>
+        <p:cNvGrpSpPr/>
+        <p:nvPr/>
+      </p:nvGrpSpPr>
+      <p:grpSpPr>
+        <a:xfrm>
+          <a:off x="0" y="0"/>
+          <a:ext cx="0" cy="0"/>
+          <a:chOff x="0" y="0"/>
+          <a:chExt cx="0" cy="0"/>
+        </a:xfrm>
+      </p:grpSpPr>
+      <p:sp>
+        <p:nvSpPr>
+          <p:cNvPr id="2" name="Slide Image Placeholder 1"/>
+          <p:cNvSpPr>
+            <a:spLocks noGrp="1" noRot="1" noChangeAspect="1"/>
+          </p:cNvSpPr>
+          <p:nvPr>
+            <p:ph type="sldImg"/>
+          </p:nvPr>
+        </p:nvSpPr>
+        <p:spPr/>
+      </p:sp>
+      <p:sp>
+        <p:nvSpPr>
+          <p:cNvPr id="3" name="Notes Placeholder 2"/>
+          <p:cNvSpPr>
+            <a:spLocks noGrp="1"/>
+          </p:cNvSpPr>
+          <p:nvPr>
+            <p:ph type="body" idx="1"/>
+          </p:nvPr>
+        </p:nvSpPr>
+        <p:spPr/>
+        <p:txBody>
+          <a:bodyPr/>
+          <a:lstStyle/>
+          <a:p>
+            <a:r>
+              <a:rPr lang="en-CA" dirty="0"/>
+              <a:t>Image source: </a:t>
+            </a:r>
+            <a:r>
+              <a:rPr lang="en-US" dirty="0"/>
+              <a:t>By </a:t>
+            </a:r>
+            <a:r>
+              <a:rPr lang="en-US" dirty="0" err="1"/>
+              <a:t>Beraldoleal</a:t>
+            </a:r>
+            <a:r>
+              <a:rPr lang="en-US" dirty="0"/>
+              <a:t> - Own work, CC BY 3.0, https://commons.wikimedia.org/w/index.php?curid=11836468</a:t>
+            </a:r>
+            <a:endParaRPr lang="en-CA" dirty="0"/>
+          </a:p>
+        </p:txBody>
+      </p:sp>
+      <p:sp>
+        <p:nvSpPr>
+          <p:cNvPr id="4" name="Slide Number Placeholder 3"/>
+          <p:cNvSpPr>
+            <a:spLocks noGrp="1"/>
+          </p:cNvSpPr>
+          <p:nvPr>
+            <p:ph type="sldNum" sz="quarter" idx="10"/>
+          </p:nvPr>
+        </p:nvSpPr>
+        <p:spPr/>
+        <p:txBody>
+          <a:bodyPr/>
+          <a:lstStyle/>
+          <a:p>
+            <a:fld id="{D7C167DB-EFF0-400D-96A1-6799F871DE5B}" type="slidenum">
+              <a:rPr lang="en-US" smtClean="0"/>
+              <a:pPr/>
+              <a:t>23</a:t>
             </a:fld>
             <a:endParaRPr lang="en-US"/>
           </a:p>
@@ -1679,7 +1768,7 @@
             <a:fld id="{DCFA480D-CB17-4C49-BB2A-C7514E1C7CEA}" type="datetimeFigureOut">
               <a:rPr lang="en-US" smtClean="0"/>
               <a:pPr/>
-              <a:t>1/5/2018</a:t>
+              <a:t>1/8/2018</a:t>
             </a:fld>
             <a:endParaRPr lang="en-US"/>
           </a:p>
@@ -1845,7 +1934,7 @@
             <a:fld id="{DCFA480D-CB17-4C49-BB2A-C7514E1C7CEA}" type="datetimeFigureOut">
               <a:rPr lang="en-US" smtClean="0"/>
               <a:pPr/>
-              <a:t>1/5/2018</a:t>
+              <a:t>1/8/2018</a:t>
             </a:fld>
             <a:endParaRPr lang="en-US"/>
           </a:p>
@@ -2020,7 +2109,7 @@
             <a:fld id="{DCFA480D-CB17-4C49-BB2A-C7514E1C7CEA}" type="datetimeFigureOut">
               <a:rPr lang="en-US" smtClean="0"/>
               <a:pPr/>
-              <a:t>1/5/2018</a:t>
+              <a:t>1/8/2018</a:t>
             </a:fld>
             <a:endParaRPr lang="en-US"/>
           </a:p>
@@ -2169,7 +2258,7 @@
             <a:fld id="{DCFA480D-CB17-4C49-BB2A-C7514E1C7CEA}" type="datetimeFigureOut">
               <a:rPr lang="en-US" smtClean="0"/>
               <a:pPr/>
-              <a:t>1/5/2018</a:t>
+              <a:t>1/8/2018</a:t>
             </a:fld>
             <a:endParaRPr lang="en-US"/>
           </a:p>
@@ -2293,7 +2382,7 @@
             <a:fld id="{DCFA480D-CB17-4C49-BB2A-C7514E1C7CEA}" type="datetimeFigureOut">
               <a:rPr lang="en-US" smtClean="0"/>
               <a:pPr/>
-              <a:t>1/5/2018</a:t>
+              <a:t>1/8/2018</a:t>
             </a:fld>
             <a:endParaRPr lang="en-US" dirty="0"/>
           </a:p>
@@ -2565,7 +2654,7 @@
             <a:fld id="{DCFA480D-CB17-4C49-BB2A-C7514E1C7CEA}" type="datetimeFigureOut">
               <a:rPr lang="en-US" smtClean="0"/>
               <a:pPr/>
-              <a:t>1/5/2018</a:t>
+              <a:t>1/8/2018</a:t>
             </a:fld>
             <a:endParaRPr lang="en-US" dirty="0"/>
           </a:p>
@@ -2837,7 +2926,7 @@
             <a:fld id="{DCFA480D-CB17-4C49-BB2A-C7514E1C7CEA}" type="datetimeFigureOut">
               <a:rPr lang="en-US" smtClean="0"/>
               <a:pPr/>
-              <a:t>1/5/2018</a:t>
+              <a:t>1/8/2018</a:t>
             </a:fld>
             <a:endParaRPr lang="en-US" dirty="0"/>
           </a:p>
@@ -3285,7 +3374,7 @@
             <a:fld id="{DCFA480D-CB17-4C49-BB2A-C7514E1C7CEA}" type="datetimeFigureOut">
               <a:rPr lang="en-US" smtClean="0"/>
               <a:pPr/>
-              <a:t>1/5/2018</a:t>
+              <a:t>1/8/2018</a:t>
             </a:fld>
             <a:endParaRPr lang="en-US" dirty="0"/>
           </a:p>
@@ -3400,7 +3489,7 @@
             <a:fld id="{DCFA480D-CB17-4C49-BB2A-C7514E1C7CEA}" type="datetimeFigureOut">
               <a:rPr lang="en-US" smtClean="0"/>
               <a:pPr/>
-              <a:t>1/5/2018</a:t>
+              <a:t>1/8/2018</a:t>
             </a:fld>
             <a:endParaRPr lang="en-US" dirty="0"/>
           </a:p>
@@ -3652,7 +3741,7 @@
             <a:fld id="{DCFA480D-CB17-4C49-BB2A-C7514E1C7CEA}" type="datetimeFigureOut">
               <a:rPr lang="en-US" smtClean="0"/>
               <a:pPr/>
-              <a:t>1/5/2018</a:t>
+              <a:t>1/8/2018</a:t>
             </a:fld>
             <a:endParaRPr lang="en-US"/>
           </a:p>
@@ -3895,7 +3984,7 @@
             <a:fld id="{DCFA480D-CB17-4C49-BB2A-C7514E1C7CEA}" type="datetimeFigureOut">
               <a:rPr lang="en-US" smtClean="0"/>
               <a:pPr/>
-              <a:t>1/5/2018</a:t>
+              <a:t>1/8/2018</a:t>
             </a:fld>
             <a:endParaRPr lang="en-US"/>
           </a:p>
@@ -4071,7 +4160,7 @@
             <a:fld id="{DCFA480D-CB17-4C49-BB2A-C7514E1C7CEA}" type="datetimeFigureOut">
               <a:rPr lang="en-US" smtClean="0"/>
               <a:pPr/>
-              <a:t>1/5/2018</a:t>
+              <a:t>1/8/2018</a:t>
             </a:fld>
             <a:endParaRPr lang="en-US" sz="1200" dirty="0">
               <a:solidFill>
@@ -5108,7 +5197,7 @@
           <a:p>
             <a:r>
               <a:rPr lang="en-US" dirty="0"/>
-              <a:t>Fought mainly over slavery</a:t>
+              <a:t>Fought mainly over slavery.</a:t>
             </a:r>
           </a:p>
           <a:p>
@@ -5132,7 +5221,7 @@
           <a:p>
             <a:r>
               <a:rPr lang="en-US" dirty="0"/>
-              <a:t>Despite efforts during reconstruction, African-Americans remained second-class citizens.</a:t>
+              <a:t>Despite efforts during reconstruction, African-Americans, though no longer slaves, became second-class citizens.</a:t>
             </a:r>
           </a:p>
           <a:p>
@@ -5157,7 +5246,7 @@
           <a:p>
             <a:r>
               <a:rPr lang="en-US" dirty="0"/>
-              <a:t>US Civil War, 1861-1865</a:t>
+              <a:t>United States Civil War, 1861-1865</a:t>
             </a:r>
           </a:p>
         </p:txBody>
@@ -5330,7 +5419,7 @@
           <a:p>
             <a:r>
               <a:rPr lang="en-US" dirty="0"/>
-              <a:t>State and local laws focused on segregation</a:t>
+              <a:t>State and local laws focused on segregation.</a:t>
             </a:r>
           </a:p>
           <a:p>
@@ -5632,7 +5721,7 @@
             </a:pPr>
             <a:r>
               <a:rPr lang="en-US" sz="3200" dirty="0"/>
-              <a:t>Began before civil war</a:t>
+              <a:t>Began before civil war.</a:t>
             </a:r>
           </a:p>
           <a:p>
@@ -5730,19 +5819,265 @@
           </a:p>
           <a:p>
             <a:r>
+              <a:rPr lang="en-US" b="1" dirty="0">
+                <a:solidFill>
+                  <a:srgbClr val="002060"/>
+                </a:solidFill>
+                <a:effectLst>
+                  <a:outerShdw blurRad="38100" dist="38100" dir="2700000" algn="tl">
+                    <a:srgbClr val="000000">
+                      <a:alpha val="43137"/>
+                    </a:srgbClr>
+                  </a:outerShdw>
+                </a:effectLst>
+              </a:rPr>
+              <a:t>Charley Patton, 1891-1934</a:t>
+            </a:r>
+          </a:p>
+          <a:p>
+            <a:pPr lvl="1"/>
+            <a:r>
               <a:rPr lang="en-US" dirty="0"/>
-              <a:t>Charley Patton</a:t>
-            </a:r>
-          </a:p>
-          <a:p>
+              <a:t>Father of the Delta Blues</a:t>
+            </a:r>
+          </a:p>
+          <a:p>
+            <a:pPr lvl="1"/>
             <a:r>
               <a:rPr lang="en-US" dirty="0"/>
-              <a:t>Eddie “Sun” House</a:t>
-            </a:r>
-          </a:p>
-          <a:p>
+              <a:t>Mixed heritage: white, black, native</a:t>
+            </a:r>
+          </a:p>
+          <a:p>
+            <a:pPr lvl="1"/>
             <a:r>
               <a:rPr lang="en-US" dirty="0"/>
+              <a:t>Dockery Plantation</a:t>
+            </a:r>
+          </a:p>
+          <a:p>
+            <a:pPr lvl="1"/>
+            <a:r>
+              <a:rPr lang="en-US" dirty="0">
+                <a:hlinkClick r:id="rId3"/>
+              </a:rPr>
+              <a:t>https://www.youtube.com/watch?v=JZ1zOarIoEA</a:t>
+            </a:r>
+            <a:endParaRPr lang="en-US" dirty="0"/>
+          </a:p>
+          <a:p>
+            <a:r>
+              <a:rPr lang="en-US" b="1" dirty="0">
+                <a:solidFill>
+                  <a:srgbClr val="002060"/>
+                </a:solidFill>
+                <a:effectLst>
+                  <a:outerShdw blurRad="38100" dist="38100" dir="2700000" algn="tl">
+                    <a:srgbClr val="000000">
+                      <a:alpha val="43137"/>
+                    </a:srgbClr>
+                  </a:outerShdw>
+                </a:effectLst>
+              </a:rPr>
+              <a:t>Eddie “Sun” House, 1902-1988</a:t>
+            </a:r>
+          </a:p>
+          <a:p>
+            <a:pPr lvl="1"/>
+            <a:r>
+              <a:rPr lang="en-US" dirty="0"/>
+              <a:t>“Death letter blues”: </a:t>
+            </a:r>
+            <a:r>
+              <a:rPr lang="en-US" dirty="0">
+                <a:hlinkClick r:id="rId4"/>
+              </a:rPr>
+              <a:t>https://www.youtube.com/watch?v=NdgrQoZHnNY</a:t>
+            </a:r>
+            <a:endParaRPr lang="en-US" dirty="0"/>
+          </a:p>
+          <a:p>
+            <a:pPr lvl="1"/>
+            <a:r>
+              <a:rPr lang="en-US" dirty="0"/>
+              <a:t>Taught Robert Johnson</a:t>
+            </a:r>
+          </a:p>
+        </p:txBody>
+      </p:sp>
+      <p:sp>
+        <p:nvSpPr>
+          <p:cNvPr id="3" name="Title 2"/>
+          <p:cNvSpPr>
+            <a:spLocks noGrp="1"/>
+          </p:cNvSpPr>
+          <p:nvPr>
+            <p:ph type="title"/>
+          </p:nvPr>
+        </p:nvSpPr>
+        <p:spPr/>
+        <p:txBody>
+          <a:bodyPr>
+            <a:noAutofit/>
+          </a:bodyPr>
+          <a:lstStyle/>
+          <a:p>
+            <a:pPr algn="ctr"/>
+            <a:r>
+              <a:rPr lang="en-US" sz="8000" dirty="0">
+                <a:solidFill>
+                  <a:schemeClr val="accent6">
+                    <a:lumMod val="75000"/>
+                  </a:schemeClr>
+                </a:solidFill>
+              </a:rPr>
+              <a:t>The Blues</a:t>
+            </a:r>
+          </a:p>
+        </p:txBody>
+      </p:sp>
+      <p:pic>
+        <p:nvPicPr>
+          <p:cNvPr id="6" name="Picture 5">
+            <a:extLst>
+              <a:ext uri="{FF2B5EF4-FFF2-40B4-BE49-F238E27FC236}">
+                <a16:creationId xmlns:a16="http://schemas.microsoft.com/office/drawing/2014/main" id="{DDB2FAC6-EBCB-4F2F-97BD-254485BD1BC6}"/>
+              </a:ext>
+            </a:extLst>
+          </p:cNvPr>
+          <p:cNvPicPr>
+            <a:picLocks noChangeAspect="1"/>
+          </p:cNvPicPr>
+          <p:nvPr/>
+        </p:nvPicPr>
+        <p:blipFill>
+          <a:blip r:embed="rId5">
+            <a:extLst>
+              <a:ext uri="{28A0092B-C50C-407E-A947-70E740481C1C}">
+                <a14:useLocalDpi xmlns:a14="http://schemas.microsoft.com/office/drawing/2010/main" val="0"/>
+              </a:ext>
+            </a:extLst>
+          </a:blip>
+          <a:stretch>
+            <a:fillRect/>
+          </a:stretch>
+        </p:blipFill>
+        <p:spPr>
+          <a:xfrm>
+            <a:off x="6629400" y="1905000"/>
+            <a:ext cx="2179320" cy="2833116"/>
+          </a:xfrm>
+          <a:prstGeom prst="rect">
+            <a:avLst/>
+          </a:prstGeom>
+          <a:ln>
+            <a:noFill/>
+          </a:ln>
+          <a:effectLst>
+            <a:softEdge rad="112500"/>
+          </a:effectLst>
+        </p:spPr>
+      </p:pic>
+      <p:sp>
+        <p:nvSpPr>
+          <p:cNvPr id="7" name="TextBox 6">
+            <a:extLst>
+              <a:ext uri="{FF2B5EF4-FFF2-40B4-BE49-F238E27FC236}">
+                <a16:creationId xmlns:a16="http://schemas.microsoft.com/office/drawing/2014/main" id="{A4484FB8-8E2A-4065-A1AA-467D331DA299}"/>
+              </a:ext>
+            </a:extLst>
+          </p:cNvPr>
+          <p:cNvSpPr txBox="1"/>
+          <p:nvPr/>
+        </p:nvSpPr>
+        <p:spPr>
+          <a:xfrm>
+            <a:off x="6653754" y="4809851"/>
+            <a:ext cx="2179319" cy="276999"/>
+          </a:xfrm>
+          <a:prstGeom prst="rect">
+            <a:avLst/>
+          </a:prstGeom>
+          <a:noFill/>
+        </p:spPr>
+        <p:txBody>
+          <a:bodyPr wrap="square" rtlCol="0">
+            <a:spAutoFit/>
+          </a:bodyPr>
+          <a:lstStyle/>
+          <a:p>
+            <a:r>
+              <a:rPr lang="en-CA" sz="1200" dirty="0"/>
+              <a:t>Only known photo of Patton</a:t>
+            </a:r>
+          </a:p>
+        </p:txBody>
+      </p:sp>
+    </p:spTree>
+    <p:extLst>
+      <p:ext uri="{BB962C8B-B14F-4D97-AF65-F5344CB8AC3E}">
+        <p14:creationId xmlns:p14="http://schemas.microsoft.com/office/powerpoint/2010/main" val="2487924114"/>
+      </p:ext>
+    </p:extLst>
+  </p:cSld>
+  <p:clrMapOvr>
+    <a:masterClrMapping/>
+  </p:clrMapOvr>
+</p:sld>
+</file>
+
+<file path=ppt/slides/slide19.xml><?xml version="1.0" encoding="utf-8"?>
+<p:sld xmlns:a="http://schemas.openxmlformats.org/drawingml/2006/main" xmlns:r="http://schemas.openxmlformats.org/officeDocument/2006/relationships" xmlns:p="http://schemas.openxmlformats.org/presentationml/2006/main">
+  <p:cSld>
+    <p:spTree>
+      <p:nvGrpSpPr>
+        <p:cNvPr id="1" name=""/>
+        <p:cNvGrpSpPr/>
+        <p:nvPr/>
+      </p:nvGrpSpPr>
+      <p:grpSpPr>
+        <a:xfrm>
+          <a:off x="0" y="0"/>
+          <a:ext cx="0" cy="0"/>
+          <a:chOff x="0" y="0"/>
+          <a:chExt cx="0" cy="0"/>
+        </a:xfrm>
+      </p:grpSpPr>
+      <p:sp>
+        <p:nvSpPr>
+          <p:cNvPr id="2" name="Content Placeholder 1"/>
+          <p:cNvSpPr>
+            <a:spLocks noGrp="1"/>
+          </p:cNvSpPr>
+          <p:nvPr>
+            <p:ph idx="1"/>
+          </p:nvPr>
+        </p:nvSpPr>
+        <p:spPr>
+          <a:xfrm>
+            <a:off x="457200" y="1524000"/>
+            <a:ext cx="5943600" cy="4572000"/>
+          </a:xfrm>
+        </p:spPr>
+        <p:txBody>
+          <a:bodyPr>
+            <a:normAutofit/>
+          </a:bodyPr>
+          <a:lstStyle/>
+          <a:p>
+            <a:r>
+              <a:rPr lang="en-US" b="1" dirty="0">
+                <a:solidFill>
+                  <a:srgbClr val="002060"/>
+                </a:solidFill>
+                <a:effectLst>
+                  <a:outerShdw blurRad="38100" dist="38100" dir="2700000" algn="tl">
+                    <a:srgbClr val="000000">
+                      <a:alpha val="43137"/>
+                    </a:srgbClr>
+                  </a:outerShdw>
+                </a:effectLst>
+              </a:rPr>
               <a:t>Robert Johnson (1911-1938) :</a:t>
             </a:r>
           </a:p>
@@ -5877,7 +6212,7 @@
     </p:spTree>
     <p:extLst>
       <p:ext uri="{BB962C8B-B14F-4D97-AF65-F5344CB8AC3E}">
-        <p14:creationId xmlns:p14="http://schemas.microsoft.com/office/powerpoint/2010/main" val="2487924114"/>
+        <p14:creationId xmlns:p14="http://schemas.microsoft.com/office/powerpoint/2010/main" val="3631238447"/>
       </p:ext>
     </p:extLst>
   </p:cSld>
@@ -5887,7 +6222,127 @@
 </p:sld>
 </file>
 
-<file path=ppt/slides/slide19.xml><?xml version="1.0" encoding="utf-8"?>
+<file path=ppt/slides/slide2.xml><?xml version="1.0" encoding="utf-8"?>
+<p:sld xmlns:a="http://schemas.openxmlformats.org/drawingml/2006/main" xmlns:r="http://schemas.openxmlformats.org/officeDocument/2006/relationships" xmlns:p="http://schemas.openxmlformats.org/presentationml/2006/main">
+  <p:cSld>
+    <p:spTree>
+      <p:nvGrpSpPr>
+        <p:cNvPr id="1" name=""/>
+        <p:cNvGrpSpPr/>
+        <p:nvPr/>
+      </p:nvGrpSpPr>
+      <p:grpSpPr>
+        <a:xfrm>
+          <a:off x="0" y="0"/>
+          <a:ext cx="0" cy="0"/>
+          <a:chOff x="0" y="0"/>
+          <a:chExt cx="0" cy="0"/>
+        </a:xfrm>
+      </p:grpSpPr>
+      <p:sp>
+        <p:nvSpPr>
+          <p:cNvPr id="3" name="Content Placeholder 2"/>
+          <p:cNvSpPr>
+            <a:spLocks noGrp="1"/>
+          </p:cNvSpPr>
+          <p:nvPr>
+            <p:ph idx="1"/>
+          </p:nvPr>
+        </p:nvSpPr>
+        <p:spPr>
+          <a:xfrm>
+            <a:off x="609600" y="1395211"/>
+            <a:ext cx="8229600" cy="4572000"/>
+          </a:xfrm>
+        </p:spPr>
+        <p:txBody>
+          <a:bodyPr>
+            <a:normAutofit lnSpcReduction="10000"/>
+          </a:bodyPr>
+          <a:lstStyle/>
+          <a:p>
+            <a:r>
+              <a:rPr lang="en-US" dirty="0"/>
+              <a:t>What is history?</a:t>
+            </a:r>
+          </a:p>
+          <a:p>
+            <a:pPr lvl="1"/>
+            <a:r>
+              <a:rPr lang="en-US" dirty="0"/>
+              <a:t>The past</a:t>
+            </a:r>
+          </a:p>
+          <a:p>
+            <a:pPr lvl="1"/>
+            <a:r>
+              <a:rPr lang="en-US" dirty="0"/>
+              <a:t>history</a:t>
+            </a:r>
+          </a:p>
+          <a:p>
+            <a:r>
+              <a:rPr lang="en-US" dirty="0"/>
+              <a:t>What is music?</a:t>
+            </a:r>
+          </a:p>
+          <a:p>
+            <a:endParaRPr lang="en-US" dirty="0"/>
+          </a:p>
+          <a:p>
+            <a:endParaRPr lang="en-US" dirty="0"/>
+          </a:p>
+          <a:p>
+            <a:r>
+              <a:rPr lang="en-US" dirty="0"/>
+              <a:t>What is Rock and Roll music?</a:t>
+            </a:r>
+          </a:p>
+          <a:p>
+            <a:endParaRPr lang="en-US" dirty="0"/>
+          </a:p>
+          <a:p>
+            <a:endParaRPr lang="en-US" dirty="0"/>
+          </a:p>
+          <a:p>
+            <a:r>
+              <a:rPr lang="en-US" dirty="0"/>
+              <a:t>Why do we like it?</a:t>
+            </a:r>
+          </a:p>
+        </p:txBody>
+      </p:sp>
+      <p:sp>
+        <p:nvSpPr>
+          <p:cNvPr id="2" name="Title 1"/>
+          <p:cNvSpPr>
+            <a:spLocks noGrp="1"/>
+          </p:cNvSpPr>
+          <p:nvPr>
+            <p:ph type="title"/>
+          </p:nvPr>
+        </p:nvSpPr>
+        <p:spPr/>
+        <p:txBody>
+          <a:bodyPr/>
+          <a:lstStyle/>
+          <a:p>
+            <a:r>
+              <a:rPr lang="en-US" dirty="0"/>
+              <a:t>Introduction</a:t>
+            </a:r>
+          </a:p>
+        </p:txBody>
+      </p:sp>
+    </p:spTree>
+  </p:cSld>
+  <p:clrMapOvr>
+    <a:masterClrMapping/>
+  </p:clrMapOvr>
+</p:sld>
+</file>
+
+<file path=ppt/slides/slide20.xml><?xml version="1.0" encoding="utf-8"?>
 <p:sld xmlns:a="http://schemas.openxmlformats.org/drawingml/2006/main" xmlns:r="http://schemas.openxmlformats.org/officeDocument/2006/relationships" xmlns:p="http://schemas.openxmlformats.org/presentationml/2006/main">
   <p:cSld>
     <p:spTree>
@@ -5988,127 +6443,7 @@
 </p:sld>
 </file>
 
-<file path=ppt/slides/slide2.xml><?xml version="1.0" encoding="utf-8"?>
-<p:sld xmlns:a="http://schemas.openxmlformats.org/drawingml/2006/main" xmlns:r="http://schemas.openxmlformats.org/officeDocument/2006/relationships" xmlns:p="http://schemas.openxmlformats.org/presentationml/2006/main">
-  <p:cSld>
-    <p:spTree>
-      <p:nvGrpSpPr>
-        <p:cNvPr id="1" name=""/>
-        <p:cNvGrpSpPr/>
-        <p:nvPr/>
-      </p:nvGrpSpPr>
-      <p:grpSpPr>
-        <a:xfrm>
-          <a:off x="0" y="0"/>
-          <a:ext cx="0" cy="0"/>
-          <a:chOff x="0" y="0"/>
-          <a:chExt cx="0" cy="0"/>
-        </a:xfrm>
-      </p:grpSpPr>
-      <p:sp>
-        <p:nvSpPr>
-          <p:cNvPr id="3" name="Content Placeholder 2"/>
-          <p:cNvSpPr>
-            <a:spLocks noGrp="1"/>
-          </p:cNvSpPr>
-          <p:nvPr>
-            <p:ph idx="1"/>
-          </p:nvPr>
-        </p:nvSpPr>
-        <p:spPr>
-          <a:xfrm>
-            <a:off x="609600" y="1395211"/>
-            <a:ext cx="8229600" cy="4572000"/>
-          </a:xfrm>
-        </p:spPr>
-        <p:txBody>
-          <a:bodyPr>
-            <a:normAutofit lnSpcReduction="10000"/>
-          </a:bodyPr>
-          <a:lstStyle/>
-          <a:p>
-            <a:r>
-              <a:rPr lang="en-US" dirty="0"/>
-              <a:t>What is history?</a:t>
-            </a:r>
-          </a:p>
-          <a:p>
-            <a:pPr lvl="1"/>
-            <a:r>
-              <a:rPr lang="en-US" dirty="0"/>
-              <a:t>The past</a:t>
-            </a:r>
-          </a:p>
-          <a:p>
-            <a:pPr lvl="1"/>
-            <a:r>
-              <a:rPr lang="en-US" dirty="0"/>
-              <a:t>history</a:t>
-            </a:r>
-          </a:p>
-          <a:p>
-            <a:r>
-              <a:rPr lang="en-US" dirty="0"/>
-              <a:t>What is music?</a:t>
-            </a:r>
-          </a:p>
-          <a:p>
-            <a:endParaRPr lang="en-US" dirty="0"/>
-          </a:p>
-          <a:p>
-            <a:endParaRPr lang="en-US" dirty="0"/>
-          </a:p>
-          <a:p>
-            <a:r>
-              <a:rPr lang="en-US" dirty="0"/>
-              <a:t>What is Rock and Roll music?</a:t>
-            </a:r>
-          </a:p>
-          <a:p>
-            <a:endParaRPr lang="en-US" dirty="0"/>
-          </a:p>
-          <a:p>
-            <a:endParaRPr lang="en-US" dirty="0"/>
-          </a:p>
-          <a:p>
-            <a:r>
-              <a:rPr lang="en-US" dirty="0"/>
-              <a:t>Why do we like it?</a:t>
-            </a:r>
-          </a:p>
-        </p:txBody>
-      </p:sp>
-      <p:sp>
-        <p:nvSpPr>
-          <p:cNvPr id="2" name="Title 1"/>
-          <p:cNvSpPr>
-            <a:spLocks noGrp="1"/>
-          </p:cNvSpPr>
-          <p:nvPr>
-            <p:ph type="title"/>
-          </p:nvPr>
-        </p:nvSpPr>
-        <p:spPr/>
-        <p:txBody>
-          <a:bodyPr/>
-          <a:lstStyle/>
-          <a:p>
-            <a:r>
-              <a:rPr lang="en-US" dirty="0"/>
-              <a:t>Introduction</a:t>
-            </a:r>
-          </a:p>
-        </p:txBody>
-      </p:sp>
-    </p:spTree>
-  </p:cSld>
-  <p:clrMapOvr>
-    <a:masterClrMapping/>
-  </p:clrMapOvr>
-</p:sld>
-</file>
-
-<file path=ppt/slides/slide20.xml><?xml version="1.0" encoding="utf-8"?>
+<file path=ppt/slides/slide21.xml><?xml version="1.0" encoding="utf-8"?>
 <p:sld xmlns:a="http://schemas.openxmlformats.org/drawingml/2006/main" xmlns:r="http://schemas.openxmlformats.org/officeDocument/2006/relationships" xmlns:p="http://schemas.openxmlformats.org/presentationml/2006/main">
   <p:cSld>
     <p:spTree>
@@ -6401,7 +6736,7 @@
 </p:sld>
 </file>
 
-<file path=ppt/slides/slide21.xml><?xml version="1.0" encoding="utf-8"?>
+<file path=ppt/slides/slide22.xml><?xml version="1.0" encoding="utf-8"?>
 <p:sld xmlns:a="http://schemas.openxmlformats.org/drawingml/2006/main" xmlns:r="http://schemas.openxmlformats.org/officeDocument/2006/relationships" xmlns:p="http://schemas.openxmlformats.org/presentationml/2006/main">
   <p:cSld>
     <p:spTree>
@@ -6430,8 +6765,8 @@
         </p:nvSpPr>
         <p:spPr>
           <a:xfrm>
-            <a:off x="4800600" y="1371600"/>
-            <a:ext cx="4171950" cy="4800600"/>
+            <a:off x="4800600" y="1295400"/>
+            <a:ext cx="4171950" cy="4876800"/>
           </a:xfrm>
         </p:spPr>
         <p:txBody>
@@ -6448,12 +6783,6 @@
           <a:p>
             <a:r>
               <a:rPr lang="en-US" dirty="0"/>
-              <a:t>Increased travel and migration, especially southern blacks to northern cities (Chicago).</a:t>
-            </a:r>
-          </a:p>
-          <a:p>
-            <a:r>
-              <a:rPr lang="en-US" dirty="0"/>
               <a:t>1877: Phonograph first invented</a:t>
             </a:r>
           </a:p>
@@ -6466,8 +6795,17 @@
           <a:p>
             <a:r>
               <a:rPr lang="en-US" dirty="0"/>
-              <a:t>African Kora - banjo</a:t>
-            </a:r>
+              <a:t>African Kora – banjo</a:t>
+            </a:r>
+          </a:p>
+          <a:p>
+            <a:r>
+              <a:rPr lang="en-US" dirty="0"/>
+              <a:t>Increased travel and migration, especially southern blacks to northern cities (Chicago).</a:t>
+            </a:r>
+          </a:p>
+          <a:p>
+            <a:endParaRPr lang="en-US" dirty="0"/>
           </a:p>
           <a:p>
             <a:pPr marL="0" indent="0">
@@ -6557,7 +6895,7 @@
 </p:sld>
 </file>
 
-<file path=ppt/slides/slide22.xml><?xml version="1.0" encoding="utf-8"?>
+<file path=ppt/slides/slide23.xml><?xml version="1.0" encoding="utf-8"?>
 <p:sld xmlns:a="http://schemas.openxmlformats.org/drawingml/2006/main" xmlns:r="http://schemas.openxmlformats.org/officeDocument/2006/relationships" xmlns:p="http://schemas.openxmlformats.org/presentationml/2006/main">
   <p:cSld>
     <p:spTree>

</xml_diff>

<commit_message>
added farm worker wages
</commit_message>
<xml_diff>
--- a/HSTR121/ppts/History_Rock_Intro.pptx
+++ b/HSTR121/ppts/History_Rock_Intro.pptx
@@ -5,7 +5,7 @@
     <p:sldMasterId id="2147483660" r:id="rId2"/>
   </p:sldMasterIdLst>
   <p:notesMasterIdLst>
-    <p:notesMasterId r:id="rId27"/>
+    <p:notesMasterId r:id="rId28"/>
   </p:notesMasterIdLst>
   <p:sldIdLst>
     <p:sldId id="256" r:id="rId3"/>
@@ -31,7 +31,8 @@
     <p:sldId id="279" r:id="rId23"/>
     <p:sldId id="282" r:id="rId24"/>
     <p:sldId id="268" r:id="rId25"/>
-    <p:sldId id="280" r:id="rId26"/>
+    <p:sldId id="283" r:id="rId26"/>
+    <p:sldId id="280" r:id="rId27"/>
   </p:sldIdLst>
   <p:sldSz cx="9144000" cy="6858000" type="screen4x3"/>
   <p:notesSz cx="6858000" cy="9144000"/>
@@ -236,7 +237,7 @@
             <a:fld id="{E28287AA-0D99-42CE-A71B-10FA9908BBF8}" type="datetimeFigureOut">
               <a:rPr lang="en-US" smtClean="0"/>
               <a:pPr/>
-              <a:t>1/9/2018</a:t>
+              <a:t>1/11/2018</a:t>
             </a:fld>
             <a:endParaRPr lang="en-US"/>
           </a:p>
@@ -851,7 +852,7 @@
             <a:fld id="{D7C167DB-EFF0-400D-96A1-6799F871DE5B}" type="slidenum">
               <a:rPr lang="en-US" smtClean="0"/>
               <a:pPr/>
-              <a:t>24</a:t>
+              <a:t>25</a:t>
             </a:fld>
             <a:endParaRPr lang="en-US"/>
           </a:p>
@@ -1857,7 +1858,7 @@
             <a:fld id="{DCFA480D-CB17-4C49-BB2A-C7514E1C7CEA}" type="datetimeFigureOut">
               <a:rPr lang="en-US" smtClean="0"/>
               <a:pPr/>
-              <a:t>1/9/2018</a:t>
+              <a:t>1/11/2018</a:t>
             </a:fld>
             <a:endParaRPr lang="en-US"/>
           </a:p>
@@ -2023,7 +2024,7 @@
             <a:fld id="{DCFA480D-CB17-4C49-BB2A-C7514E1C7CEA}" type="datetimeFigureOut">
               <a:rPr lang="en-US" smtClean="0"/>
               <a:pPr/>
-              <a:t>1/9/2018</a:t>
+              <a:t>1/11/2018</a:t>
             </a:fld>
             <a:endParaRPr lang="en-US"/>
           </a:p>
@@ -2198,7 +2199,7 @@
             <a:fld id="{DCFA480D-CB17-4C49-BB2A-C7514E1C7CEA}" type="datetimeFigureOut">
               <a:rPr lang="en-US" smtClean="0"/>
               <a:pPr/>
-              <a:t>1/9/2018</a:t>
+              <a:t>1/11/2018</a:t>
             </a:fld>
             <a:endParaRPr lang="en-US"/>
           </a:p>
@@ -2347,7 +2348,7 @@
             <a:fld id="{DCFA480D-CB17-4C49-BB2A-C7514E1C7CEA}" type="datetimeFigureOut">
               <a:rPr lang="en-US" smtClean="0"/>
               <a:pPr/>
-              <a:t>1/9/2018</a:t>
+              <a:t>1/11/2018</a:t>
             </a:fld>
             <a:endParaRPr lang="en-US"/>
           </a:p>
@@ -2471,7 +2472,7 @@
             <a:fld id="{DCFA480D-CB17-4C49-BB2A-C7514E1C7CEA}" type="datetimeFigureOut">
               <a:rPr lang="en-US" smtClean="0"/>
               <a:pPr/>
-              <a:t>1/9/2018</a:t>
+              <a:t>1/11/2018</a:t>
             </a:fld>
             <a:endParaRPr lang="en-US" dirty="0"/>
           </a:p>
@@ -2743,7 +2744,7 @@
             <a:fld id="{DCFA480D-CB17-4C49-BB2A-C7514E1C7CEA}" type="datetimeFigureOut">
               <a:rPr lang="en-US" smtClean="0"/>
               <a:pPr/>
-              <a:t>1/9/2018</a:t>
+              <a:t>1/11/2018</a:t>
             </a:fld>
             <a:endParaRPr lang="en-US" dirty="0"/>
           </a:p>
@@ -3015,7 +3016,7 @@
             <a:fld id="{DCFA480D-CB17-4C49-BB2A-C7514E1C7CEA}" type="datetimeFigureOut">
               <a:rPr lang="en-US" smtClean="0"/>
               <a:pPr/>
-              <a:t>1/9/2018</a:t>
+              <a:t>1/11/2018</a:t>
             </a:fld>
             <a:endParaRPr lang="en-US" dirty="0"/>
           </a:p>
@@ -3463,7 +3464,7 @@
             <a:fld id="{DCFA480D-CB17-4C49-BB2A-C7514E1C7CEA}" type="datetimeFigureOut">
               <a:rPr lang="en-US" smtClean="0"/>
               <a:pPr/>
-              <a:t>1/9/2018</a:t>
+              <a:t>1/11/2018</a:t>
             </a:fld>
             <a:endParaRPr lang="en-US" dirty="0"/>
           </a:p>
@@ -3578,7 +3579,7 @@
             <a:fld id="{DCFA480D-CB17-4C49-BB2A-C7514E1C7CEA}" type="datetimeFigureOut">
               <a:rPr lang="en-US" smtClean="0"/>
               <a:pPr/>
-              <a:t>1/9/2018</a:t>
+              <a:t>1/11/2018</a:t>
             </a:fld>
             <a:endParaRPr lang="en-US" dirty="0"/>
           </a:p>
@@ -3830,7 +3831,7 @@
             <a:fld id="{DCFA480D-CB17-4C49-BB2A-C7514E1C7CEA}" type="datetimeFigureOut">
               <a:rPr lang="en-US" smtClean="0"/>
               <a:pPr/>
-              <a:t>1/9/2018</a:t>
+              <a:t>1/11/2018</a:t>
             </a:fld>
             <a:endParaRPr lang="en-US"/>
           </a:p>
@@ -4073,7 +4074,7 @@
             <a:fld id="{DCFA480D-CB17-4C49-BB2A-C7514E1C7CEA}" type="datetimeFigureOut">
               <a:rPr lang="en-US" smtClean="0"/>
               <a:pPr/>
-              <a:t>1/9/2018</a:t>
+              <a:t>1/11/2018</a:t>
             </a:fld>
             <a:endParaRPr lang="en-US"/>
           </a:p>
@@ -4249,7 +4250,7 @@
             <a:fld id="{DCFA480D-CB17-4C49-BB2A-C7514E1C7CEA}" type="datetimeFigureOut">
               <a:rPr lang="en-US" smtClean="0"/>
               <a:pPr/>
-              <a:t>1/9/2018</a:t>
+              <a:t>1/11/2018</a:t>
             </a:fld>
             <a:endParaRPr lang="en-US" sz="1200" dirty="0">
               <a:solidFill>
@@ -6850,7 +6851,7 @@
         </p:nvSpPr>
         <p:spPr>
           <a:xfrm>
-            <a:off x="457200" y="1524000"/>
+            <a:off x="440703" y="1295400"/>
             <a:ext cx="4876800" cy="5029200"/>
           </a:xfrm>
         </p:spPr>
@@ -6935,7 +6936,12 @@
             <p:ph type="title"/>
           </p:nvPr>
         </p:nvSpPr>
-        <p:spPr/>
+        <p:spPr>
+          <a:xfrm>
+            <a:off x="457200" y="152400"/>
+            <a:ext cx="8229600" cy="914400"/>
+          </a:xfrm>
+        </p:spPr>
         <p:txBody>
           <a:bodyPr/>
           <a:lstStyle/>
@@ -7156,6 +7162,84 @@
 </file>
 
 <file path=ppt/slides/slide24.xml><?xml version="1.0" encoding="utf-8"?>
+<p:sld xmlns:a="http://schemas.openxmlformats.org/drawingml/2006/main" xmlns:r="http://schemas.openxmlformats.org/officeDocument/2006/relationships" xmlns:p="http://schemas.openxmlformats.org/presentationml/2006/main">
+  <p:cSld>
+    <p:spTree>
+      <p:nvGrpSpPr>
+        <p:cNvPr id="1" name=""/>
+        <p:cNvGrpSpPr/>
+        <p:nvPr/>
+      </p:nvGrpSpPr>
+      <p:grpSpPr>
+        <a:xfrm>
+          <a:off x="0" y="0"/>
+          <a:ext cx="0" cy="0"/>
+          <a:chOff x="0" y="0"/>
+          <a:chExt cx="0" cy="0"/>
+        </a:xfrm>
+      </p:grpSpPr>
+      <p:pic>
+        <p:nvPicPr>
+          <p:cNvPr id="5" name="Content Placeholder 4">
+            <a:extLst>
+              <a:ext uri="{FF2B5EF4-FFF2-40B4-BE49-F238E27FC236}">
+                <a16:creationId xmlns:a16="http://schemas.microsoft.com/office/drawing/2014/main" id="{2CCD4A1A-FE4E-46CB-94B3-9C1F95DCD801}"/>
+              </a:ext>
+            </a:extLst>
+          </p:cNvPr>
+          <p:cNvPicPr>
+            <a:picLocks noGrp="1" noChangeAspect="1"/>
+          </p:cNvPicPr>
+          <p:nvPr>
+            <p:ph idx="1"/>
+          </p:nvPr>
+        </p:nvPicPr>
+        <p:blipFill>
+          <a:blip r:embed="rId2">
+            <a:extLst>
+              <a:ext uri="{28A0092B-C50C-407E-A947-70E740481C1C}">
+                <a14:useLocalDpi xmlns:a14="http://schemas.microsoft.com/office/drawing/2010/main" val="0"/>
+              </a:ext>
+            </a:extLst>
+          </a:blip>
+          <a:stretch>
+            <a:fillRect/>
+          </a:stretch>
+        </p:blipFill>
+        <p:spPr>
+          <a:xfrm>
+            <a:off x="1104901" y="368654"/>
+            <a:ext cx="6934199" cy="6120691"/>
+          </a:xfrm>
+          <a:prstGeom prst="rect">
+            <a:avLst/>
+          </a:prstGeom>
+          <a:ln>
+            <a:noFill/>
+          </a:ln>
+          <a:effectLst>
+            <a:outerShdw blurRad="292100" dist="139700" dir="2700000" algn="tl" rotWithShape="0">
+              <a:srgbClr val="333333">
+                <a:alpha val="65000"/>
+              </a:srgbClr>
+            </a:outerShdw>
+          </a:effectLst>
+        </p:spPr>
+      </p:pic>
+    </p:spTree>
+    <p:extLst>
+      <p:ext uri="{BB962C8B-B14F-4D97-AF65-F5344CB8AC3E}">
+        <p14:creationId xmlns:p14="http://schemas.microsoft.com/office/powerpoint/2010/main" val="532160636"/>
+      </p:ext>
+    </p:extLst>
+  </p:cSld>
+  <p:clrMapOvr>
+    <a:masterClrMapping/>
+  </p:clrMapOvr>
+</p:sld>
+</file>
+
+<file path=ppt/slides/slide25.xml><?xml version="1.0" encoding="utf-8"?>
 <p:sld xmlns:a="http://schemas.openxmlformats.org/drawingml/2006/main" xmlns:r="http://schemas.openxmlformats.org/officeDocument/2006/relationships" xmlns:p="http://schemas.openxmlformats.org/presentationml/2006/main">
   <p:cSld>
     <p:spTree>

</xml_diff>